<commit_message>
added figs. changed positions. close to sending a first draft.
</commit_message>
<xml_diff>
--- a/ICPRAM_poster/poster2.pptx
+++ b/ICPRAM_poster/poster2.pptx
@@ -289,7 +289,7 @@
             <a:fld id="{BFC110DA-795F-41C5-8E6D-063BF805EC2F}" type="datetimeFigureOut">
               <a:rPr lang="en-US" smtClean="0"/>
               <a:pPr/>
-              <a:t>1/18/2016</a:t>
+              <a:t>1/20/2016</a:t>
             </a:fld>
             <a:endParaRPr lang="en-US"/>
           </a:p>
@@ -456,7 +456,7 @@
             <a:fld id="{BFC110DA-795F-41C5-8E6D-063BF805EC2F}" type="datetimeFigureOut">
               <a:rPr lang="en-US" smtClean="0"/>
               <a:pPr/>
-              <a:t>1/18/2016</a:t>
+              <a:t>1/20/2016</a:t>
             </a:fld>
             <a:endParaRPr lang="en-US"/>
           </a:p>
@@ -633,7 +633,7 @@
             <a:fld id="{BFC110DA-795F-41C5-8E6D-063BF805EC2F}" type="datetimeFigureOut">
               <a:rPr lang="en-US" smtClean="0"/>
               <a:pPr/>
-              <a:t>1/18/2016</a:t>
+              <a:t>1/20/2016</a:t>
             </a:fld>
             <a:endParaRPr lang="en-US"/>
           </a:p>
@@ -800,7 +800,7 @@
             <a:fld id="{BFC110DA-795F-41C5-8E6D-063BF805EC2F}" type="datetimeFigureOut">
               <a:rPr lang="en-US" smtClean="0"/>
               <a:pPr/>
-              <a:t>1/18/2016</a:t>
+              <a:t>1/20/2016</a:t>
             </a:fld>
             <a:endParaRPr lang="en-US"/>
           </a:p>
@@ -1043,7 +1043,7 @@
             <a:fld id="{BFC110DA-795F-41C5-8E6D-063BF805EC2F}" type="datetimeFigureOut">
               <a:rPr lang="en-US" smtClean="0"/>
               <a:pPr/>
-              <a:t>1/18/2016</a:t>
+              <a:t>1/20/2016</a:t>
             </a:fld>
             <a:endParaRPr lang="en-US"/>
           </a:p>
@@ -1328,7 +1328,7 @@
             <a:fld id="{BFC110DA-795F-41C5-8E6D-063BF805EC2F}" type="datetimeFigureOut">
               <a:rPr lang="en-US" smtClean="0"/>
               <a:pPr/>
-              <a:t>1/18/2016</a:t>
+              <a:t>1/20/2016</a:t>
             </a:fld>
             <a:endParaRPr lang="en-US"/>
           </a:p>
@@ -1752,7 +1752,7 @@
             <a:fld id="{BFC110DA-795F-41C5-8E6D-063BF805EC2F}" type="datetimeFigureOut">
               <a:rPr lang="en-US" smtClean="0"/>
               <a:pPr/>
-              <a:t>1/18/2016</a:t>
+              <a:t>1/20/2016</a:t>
             </a:fld>
             <a:endParaRPr lang="en-US"/>
           </a:p>
@@ -1867,7 +1867,7 @@
             <a:fld id="{BFC110DA-795F-41C5-8E6D-063BF805EC2F}" type="datetimeFigureOut">
               <a:rPr lang="en-US" smtClean="0"/>
               <a:pPr/>
-              <a:t>1/18/2016</a:t>
+              <a:t>1/20/2016</a:t>
             </a:fld>
             <a:endParaRPr lang="en-US"/>
           </a:p>
@@ -1959,7 +1959,7 @@
             <a:fld id="{BFC110DA-795F-41C5-8E6D-063BF805EC2F}" type="datetimeFigureOut">
               <a:rPr lang="en-US" smtClean="0"/>
               <a:pPr/>
-              <a:t>1/18/2016</a:t>
+              <a:t>1/20/2016</a:t>
             </a:fld>
             <a:endParaRPr lang="en-US"/>
           </a:p>
@@ -2233,7 +2233,7 @@
             <a:fld id="{BFC110DA-795F-41C5-8E6D-063BF805EC2F}" type="datetimeFigureOut">
               <a:rPr lang="en-US" smtClean="0"/>
               <a:pPr/>
-              <a:t>1/18/2016</a:t>
+              <a:t>1/20/2016</a:t>
             </a:fld>
             <a:endParaRPr lang="en-US"/>
           </a:p>
@@ -2483,7 +2483,7 @@
             <a:fld id="{BFC110DA-795F-41C5-8E6D-063BF805EC2F}" type="datetimeFigureOut">
               <a:rPr lang="en-US" smtClean="0"/>
               <a:pPr/>
-              <a:t>1/18/2016</a:t>
+              <a:t>1/20/2016</a:t>
             </a:fld>
             <a:endParaRPr lang="en-US"/>
           </a:p>
@@ -2693,7 +2693,7 @@
             <a:fld id="{BFC110DA-795F-41C5-8E6D-063BF805EC2F}" type="datetimeFigureOut">
               <a:rPr lang="en-US" smtClean="0"/>
               <a:pPr/>
-              <a:t>1/18/2016</a:t>
+              <a:t>1/20/2016</a:t>
             </a:fld>
             <a:endParaRPr lang="en-US"/>
           </a:p>
@@ -3081,13 +3081,13 @@
         </p:spPr>
         <p:style>
           <a:lnRef idx="1">
-            <a:schemeClr val="accent2"/>
+            <a:schemeClr val="accent1"/>
           </a:lnRef>
           <a:fillRef idx="2">
-            <a:schemeClr val="accent2"/>
+            <a:schemeClr val="accent1"/>
           </a:fillRef>
           <a:effectRef idx="1">
-            <a:schemeClr val="accent2"/>
+            <a:schemeClr val="accent1"/>
           </a:effectRef>
           <a:fontRef idx="minor">
             <a:schemeClr val="dk1"/>
@@ -3099,7 +3099,7 @@
           <a:p>
             <a:pPr algn="ctr"/>
             <a:endParaRPr lang="en-US">
-              <a:latin typeface="Arial" pitchFamily="34" charset="0"/>
+              <a:latin typeface="+mj-lt"/>
               <a:cs typeface="Arial" pitchFamily="34" charset="0"/>
             </a:endParaRPr>
           </a:p>
@@ -3122,13 +3122,13 @@
         </p:spPr>
         <p:style>
           <a:lnRef idx="1">
-            <a:schemeClr val="accent2"/>
+            <a:schemeClr val="accent1"/>
           </a:lnRef>
           <a:fillRef idx="3">
-            <a:schemeClr val="accent2"/>
+            <a:schemeClr val="accent1"/>
           </a:fillRef>
           <a:effectRef idx="2">
-            <a:schemeClr val="accent2"/>
+            <a:schemeClr val="accent1"/>
           </a:effectRef>
           <a:fontRef idx="minor">
             <a:schemeClr val="lt1"/>
@@ -3143,7 +3143,7 @@
             <a:pPr algn="ctr"/>
             <a:r>
               <a:rPr lang="en-US" sz="7200" dirty="0" smtClean="0">
-                <a:latin typeface="Arial" pitchFamily="34" charset="0"/>
+                <a:latin typeface="+mj-lt"/>
                 <a:cs typeface="Arial" pitchFamily="34" charset="0"/>
               </a:rPr>
               <a:t>Efficient Evidence Accumulation Clustering</a:t>
@@ -3153,13 +3153,13 @@
             <a:pPr algn="ctr"/>
             <a:r>
               <a:rPr lang="en-US" sz="7200" dirty="0" smtClean="0">
-                <a:latin typeface="Arial" pitchFamily="34" charset="0"/>
+                <a:latin typeface="+mj-lt"/>
                 <a:cs typeface="Arial" pitchFamily="34" charset="0"/>
               </a:rPr>
               <a:t>for large datasets</a:t>
             </a:r>
             <a:endParaRPr lang="en-US" sz="7200" dirty="0">
-              <a:latin typeface="Arial" pitchFamily="34" charset="0"/>
+              <a:latin typeface="+mj-lt"/>
               <a:cs typeface="Arial" pitchFamily="34" charset="0"/>
             </a:endParaRPr>
           </a:p>
@@ -3190,55 +3190,55 @@
             <a:pPr algn="ctr"/>
             <a:r>
               <a:rPr lang="en-US" sz="6000" b="1" dirty="0" err="1" smtClean="0">
-                <a:latin typeface="Arial" pitchFamily="34" charset="0"/>
+                <a:latin typeface="+mj-lt"/>
                 <a:cs typeface="Arial" pitchFamily="34" charset="0"/>
               </a:rPr>
               <a:t>Diogo</a:t>
             </a:r>
             <a:r>
               <a:rPr lang="en-US" sz="6000" b="1" dirty="0" smtClean="0">
-                <a:latin typeface="Arial" pitchFamily="34" charset="0"/>
+                <a:latin typeface="+mj-lt"/>
                 <a:cs typeface="Arial" pitchFamily="34" charset="0"/>
               </a:rPr>
               <a:t> Silva</a:t>
             </a:r>
             <a:r>
               <a:rPr lang="en-US" sz="6000" baseline="30000" dirty="0" smtClean="0">
-                <a:latin typeface="Arial" pitchFamily="34" charset="0"/>
+                <a:latin typeface="+mj-lt"/>
                 <a:cs typeface="Arial" pitchFamily="34" charset="0"/>
               </a:rPr>
               <a:t>1</a:t>
             </a:r>
             <a:r>
               <a:rPr lang="en-US" sz="6000" b="1" dirty="0" smtClean="0">
-                <a:latin typeface="Arial" pitchFamily="34" charset="0"/>
+                <a:latin typeface="+mj-lt"/>
                 <a:cs typeface="Arial" pitchFamily="34" charset="0"/>
               </a:rPr>
               <a:t>, Helena Aidos</a:t>
             </a:r>
             <a:r>
               <a:rPr lang="en-US" sz="6000" baseline="30000" dirty="0" smtClean="0">
-                <a:latin typeface="Arial" pitchFamily="34" charset="0"/>
+                <a:latin typeface="+mj-lt"/>
                 <a:cs typeface="Arial" pitchFamily="34" charset="0"/>
               </a:rPr>
               <a:t>2</a:t>
             </a:r>
             <a:r>
               <a:rPr lang="en-US" sz="6000" b="1" dirty="0" smtClean="0">
-                <a:latin typeface="Arial" pitchFamily="34" charset="0"/>
+                <a:latin typeface="+mj-lt"/>
                 <a:cs typeface="Arial" pitchFamily="34" charset="0"/>
               </a:rPr>
               <a:t> and Ana Fred</a:t>
             </a:r>
             <a:r>
               <a:rPr lang="en-US" sz="6000" baseline="30000" dirty="0" smtClean="0">
-                <a:latin typeface="Arial" pitchFamily="34" charset="0"/>
+                <a:latin typeface="+mj-lt"/>
                 <a:cs typeface="Arial" pitchFamily="34" charset="0"/>
               </a:rPr>
               <a:t>2</a:t>
             </a:r>
             <a:endParaRPr lang="en-US" sz="7200" dirty="0">
-              <a:latin typeface="Arial" pitchFamily="34" charset="0"/>
+              <a:latin typeface="+mj-lt"/>
               <a:cs typeface="Arial" pitchFamily="34" charset="0"/>
             </a:endParaRPr>
           </a:p>
@@ -3246,28 +3246,28 @@
             <a:pPr algn="ctr"/>
             <a:r>
               <a:rPr lang="en-US" sz="4800" baseline="30000" dirty="0" smtClean="0">
-                <a:latin typeface="Arial" pitchFamily="34" charset="0"/>
+                <a:latin typeface="+mj-lt"/>
                 <a:cs typeface="Arial" pitchFamily="34" charset="0"/>
               </a:rPr>
               <a:t>1</a:t>
             </a:r>
             <a:r>
               <a:rPr lang="en-US" sz="4800" dirty="0" smtClean="0">
-                <a:latin typeface="Arial" pitchFamily="34" charset="0"/>
+                <a:latin typeface="+mj-lt"/>
                 <a:cs typeface="Arial" pitchFamily="34" charset="0"/>
               </a:rPr>
               <a:t>Portuguese Air Force Academy, </a:t>
             </a:r>
             <a:r>
               <a:rPr lang="en-US" sz="4800" dirty="0" err="1" smtClean="0">
-                <a:latin typeface="Arial" pitchFamily="34" charset="0"/>
+                <a:latin typeface="+mj-lt"/>
                 <a:cs typeface="Arial" pitchFamily="34" charset="0"/>
               </a:rPr>
               <a:t>Sintra</a:t>
             </a:r>
             <a:r>
               <a:rPr lang="en-US" sz="4800" dirty="0" smtClean="0">
-                <a:latin typeface="Arial" pitchFamily="34" charset="0"/>
+                <a:latin typeface="+mj-lt"/>
                 <a:cs typeface="Arial" pitchFamily="34" charset="0"/>
               </a:rPr>
               <a:t> Portugal</a:t>
@@ -3277,56 +3277,56 @@
             <a:pPr algn="ctr"/>
             <a:r>
               <a:rPr lang="en-US" sz="4800" baseline="30000" dirty="0" smtClean="0">
-                <a:latin typeface="Arial" pitchFamily="34" charset="0"/>
+                <a:latin typeface="+mj-lt"/>
                 <a:cs typeface="Arial" pitchFamily="34" charset="0"/>
               </a:rPr>
               <a:t>2</a:t>
             </a:r>
             <a:r>
               <a:rPr lang="en-US" sz="4800" dirty="0" smtClean="0">
-                <a:latin typeface="Arial" pitchFamily="34" charset="0"/>
+                <a:latin typeface="+mj-lt"/>
                 <a:cs typeface="Arial" pitchFamily="34" charset="0"/>
               </a:rPr>
               <a:t>Instituto de </a:t>
             </a:r>
             <a:r>
               <a:rPr lang="en-US" sz="4800" dirty="0" err="1" smtClean="0">
-                <a:latin typeface="Arial" pitchFamily="34" charset="0"/>
+                <a:latin typeface="+mj-lt"/>
                 <a:cs typeface="Arial" pitchFamily="34" charset="0"/>
               </a:rPr>
               <a:t>Telecomunicações</a:t>
             </a:r>
             <a:r>
               <a:rPr lang="en-US" sz="4800" dirty="0" smtClean="0">
-                <a:latin typeface="Arial" pitchFamily="34" charset="0"/>
+                <a:latin typeface="+mj-lt"/>
                 <a:cs typeface="Arial" pitchFamily="34" charset="0"/>
               </a:rPr>
               <a:t>, </a:t>
             </a:r>
             <a:r>
               <a:rPr lang="en-US" sz="4800" dirty="0" err="1" smtClean="0">
-                <a:latin typeface="Arial" pitchFamily="34" charset="0"/>
+                <a:latin typeface="+mj-lt"/>
                 <a:cs typeface="Arial" pitchFamily="34" charset="0"/>
               </a:rPr>
               <a:t>Instituto</a:t>
             </a:r>
             <a:r>
               <a:rPr lang="en-US" sz="4800" dirty="0" smtClean="0">
-                <a:latin typeface="Arial" pitchFamily="34" charset="0"/>
+                <a:latin typeface="+mj-lt"/>
                 <a:cs typeface="Arial" pitchFamily="34" charset="0"/>
               </a:rPr>
               <a:t> Superior </a:t>
             </a:r>
             <a:r>
               <a:rPr lang="en-US" sz="4800" dirty="0" err="1" smtClean="0">
-                <a:latin typeface="Arial" pitchFamily="34" charset="0"/>
+                <a:latin typeface="+mj-lt"/>
                 <a:cs typeface="Arial" pitchFamily="34" charset="0"/>
               </a:rPr>
               <a:t>Técnico</a:t>
             </a:r>
             <a:r>
               <a:rPr lang="en-US" sz="4800" dirty="0" smtClean="0">
-                <a:latin typeface="Arial" pitchFamily="34" charset="0"/>
+                <a:latin typeface="+mj-lt"/>
                 <a:cs typeface="Arial" pitchFamily="34" charset="0"/>
               </a:rPr>
               <a:t>, Lisbon, Portugal</a:t>
@@ -3336,48 +3336,48 @@
             <a:pPr algn="ctr"/>
             <a:r>
               <a:rPr lang="en-US" sz="4800" dirty="0" smtClean="0">
-                <a:latin typeface="Arial" pitchFamily="34" charset="0"/>
+                <a:latin typeface="+mj-lt"/>
                 <a:cs typeface="Arial" pitchFamily="34" charset="0"/>
               </a:rPr>
               <a:t>dasilva@academiafa.edu.pt, {</a:t>
             </a:r>
             <a:r>
               <a:rPr lang="en-US" sz="4800" dirty="0" err="1" smtClean="0">
-                <a:latin typeface="Arial" pitchFamily="34" charset="0"/>
+                <a:latin typeface="+mj-lt"/>
                 <a:cs typeface="Arial" pitchFamily="34" charset="0"/>
               </a:rPr>
               <a:t>haidos</a:t>
             </a:r>
             <a:r>
               <a:rPr lang="en-US" sz="4800" dirty="0" smtClean="0">
-                <a:latin typeface="Arial" pitchFamily="34" charset="0"/>
+                <a:latin typeface="+mj-lt"/>
                 <a:cs typeface="Arial" pitchFamily="34" charset="0"/>
               </a:rPr>
               <a:t>, </a:t>
             </a:r>
             <a:r>
               <a:rPr lang="en-US" sz="4800" dirty="0" err="1" smtClean="0">
-                <a:latin typeface="Arial" pitchFamily="34" charset="0"/>
+                <a:latin typeface="+mj-lt"/>
                 <a:cs typeface="Arial" pitchFamily="34" charset="0"/>
               </a:rPr>
               <a:t>afred</a:t>
             </a:r>
             <a:r>
               <a:rPr lang="en-US" sz="4800" dirty="0" smtClean="0">
-                <a:latin typeface="Arial" pitchFamily="34" charset="0"/>
+                <a:latin typeface="+mj-lt"/>
                 <a:cs typeface="Arial" pitchFamily="34" charset="0"/>
               </a:rPr>
               <a:t>}@</a:t>
             </a:r>
             <a:r>
               <a:rPr lang="en-US" sz="4800" dirty="0" err="1" smtClean="0">
-                <a:latin typeface="Arial" pitchFamily="34" charset="0"/>
+                <a:latin typeface="+mj-lt"/>
                 <a:cs typeface="Arial" pitchFamily="34" charset="0"/>
               </a:rPr>
               <a:t>lx.it.pt</a:t>
             </a:r>
             <a:endParaRPr lang="en-US" sz="4800" dirty="0" smtClean="0">
-              <a:latin typeface="Arial" pitchFamily="34" charset="0"/>
+              <a:latin typeface="+mj-lt"/>
               <a:cs typeface="Arial" pitchFamily="34" charset="0"/>
             </a:endParaRPr>
           </a:p>
@@ -3431,40 +3431,6 @@
           </a:prstGeom>
         </p:spPr>
       </p:pic>
-      <p:pic>
-        <p:nvPicPr>
-          <p:cNvPr id="9" name="Imagem 8" descr="speedup_dim2.png"/>
-          <p:cNvPicPr>
-            <a:picLocks noChangeAspect="1"/>
-          </p:cNvPicPr>
-          <p:nvPr/>
-        </p:nvPicPr>
-        <p:blipFill>
-          <a:blip r:embed="rId4"/>
-          <a:stretch>
-            <a:fillRect/>
-          </a:stretch>
-        </p:blipFill>
-        <p:spPr>
-          <a:xfrm>
-            <a:off x="10945267" y="17563280"/>
-            <a:ext cx="6697185" cy="4929222"/>
-          </a:xfrm>
-          <a:prstGeom prst="rect">
-            <a:avLst/>
-          </a:prstGeom>
-          <a:solidFill>
-            <a:schemeClr val="bg1"/>
-          </a:solidFill>
-          <a:effectLst>
-            <a:outerShdw blurRad="63500" sx="102000" sy="102000" algn="ctr" rotWithShape="0">
-              <a:prstClr val="black">
-                <a:alpha val="40000"/>
-              </a:prstClr>
-            </a:outerShdw>
-          </a:effectLst>
-        </p:spPr>
-      </p:pic>
       <p:sp>
         <p:nvSpPr>
           <p:cNvPr id="70" name="CaixaDeTexto 69"/>
@@ -3489,24 +3455,24 @@
           <a:p>
             <a:pPr algn="ctr"/>
             <a:r>
-              <a:rPr lang="en-US" sz="4000" cap="all" dirty="0" smtClean="0">
+              <a:rPr lang="en-US" sz="4000" b="1" cap="all" dirty="0" smtClean="0">
                 <a:solidFill>
                   <a:schemeClr val="tx2">
                     <a:lumMod val="50000"/>
                   </a:schemeClr>
                 </a:solidFill>
-                <a:latin typeface="Arial Black" pitchFamily="34" charset="0"/>
+                <a:latin typeface="+mj-lt"/>
                 <a:cs typeface="Arial" pitchFamily="34" charset="0"/>
               </a:rPr>
               <a:t>Dataset</a:t>
             </a:r>
-            <a:endParaRPr lang="en-US" sz="4000" cap="all" dirty="0">
+            <a:endParaRPr lang="en-US" sz="4000" b="1" cap="all" dirty="0">
               <a:solidFill>
                 <a:schemeClr val="tx2">
                   <a:lumMod val="50000"/>
                 </a:schemeClr>
               </a:solidFill>
-              <a:latin typeface="Arial Black" pitchFamily="34" charset="0"/>
+              <a:latin typeface="+mj-lt"/>
               <a:cs typeface="Arial" pitchFamily="34" charset="0"/>
             </a:endParaRPr>
           </a:p>
@@ -3520,7 +3486,7 @@
         </p:nvSpPr>
         <p:spPr>
           <a:xfrm>
-            <a:off x="5753285" y="20826720"/>
+            <a:off x="4176515" y="21100670"/>
             <a:ext cx="3537961" cy="1987267"/>
           </a:xfrm>
           <a:prstGeom prst="roundRect">
@@ -3547,8 +3513,8 @@
           <a:p>
             <a:pPr algn="ctr"/>
             <a:r>
-              <a:rPr lang="en-US" sz="3600" dirty="0" smtClean="0">
-                <a:latin typeface="Arial Black" pitchFamily="34" charset="0"/>
+              <a:rPr lang="en-US" sz="3200" b="1" dirty="0" smtClean="0">
+                <a:latin typeface="+mj-lt"/>
                 <a:cs typeface="Arial" pitchFamily="34" charset="0"/>
               </a:rPr>
               <a:t>Solution</a:t>
@@ -3557,21 +3523,14 @@
           <a:p>
             <a:pPr algn="ctr"/>
             <a:r>
-              <a:rPr lang="en-US" sz="3600" dirty="0" smtClean="0">
-                <a:latin typeface="Arial" pitchFamily="34" charset="0"/>
-                <a:cs typeface="Arial" pitchFamily="34" charset="0"/>
-              </a:rPr>
-              <a:t>Parallel </a:t>
-            </a:r>
-            <a:r>
-              <a:rPr lang="en-US" sz="3600" dirty="0" smtClean="0">
-                <a:latin typeface="Arial" pitchFamily="34" charset="0"/>
-                <a:cs typeface="Arial" pitchFamily="34" charset="0"/>
-              </a:rPr>
-              <a:t>GPU K-Means</a:t>
-            </a:r>
-            <a:endParaRPr lang="en-US" sz="3600" dirty="0">
-              <a:latin typeface="Arial" pitchFamily="34" charset="0"/>
+              <a:rPr lang="en-US" sz="3200" dirty="0" smtClean="0">
+                <a:latin typeface="+mj-lt"/>
+                <a:cs typeface="Arial" pitchFamily="34" charset="0"/>
+              </a:rPr>
+              <a:t>Parallel GPU K-Means</a:t>
+            </a:r>
+            <a:endParaRPr lang="en-US" sz="3200" dirty="0">
+              <a:latin typeface="+mj-lt"/>
               <a:cs typeface="Arial" pitchFamily="34" charset="0"/>
             </a:endParaRPr>
           </a:p>
@@ -3627,7 +3586,7 @@
           <p:nvPr/>
         </p:nvPicPr>
         <p:blipFill>
-          <a:blip r:embed="rId5"/>
+          <a:blip r:embed="rId4"/>
           <a:srcRect r="52258"/>
           <a:stretch>
             <a:fillRect/>
@@ -3635,8 +3594,8 @@
         </p:blipFill>
         <p:spPr>
           <a:xfrm>
-            <a:off x="12165137" y="25777604"/>
-            <a:ext cx="5055932" cy="5359942"/>
+            <a:off x="11809363" y="24931727"/>
+            <a:ext cx="6120680" cy="6488713"/>
           </a:xfrm>
           <a:prstGeom prst="rect">
             <a:avLst/>
@@ -3659,7 +3618,7 @@
           <p:nvPr/>
         </p:nvPicPr>
         <p:blipFill>
-          <a:blip r:embed="rId6"/>
+          <a:blip r:embed="rId5"/>
           <a:srcRect r="51274"/>
           <a:stretch>
             <a:fillRect/>
@@ -3667,8 +3626,8 @@
         </p:blipFill>
         <p:spPr>
           <a:xfrm>
-            <a:off x="19946267" y="25585911"/>
-            <a:ext cx="6653655" cy="5800622"/>
+            <a:off x="20332846" y="24875723"/>
+            <a:ext cx="7497458" cy="6536245"/>
           </a:xfrm>
           <a:prstGeom prst="rect">
             <a:avLst/>
@@ -3691,7 +3650,7 @@
           <p:nvPr/>
         </p:nvPicPr>
         <p:blipFill>
-          <a:blip r:embed="rId5"/>
+          <a:blip r:embed="rId4"/>
           <a:srcRect l="52258"/>
           <a:stretch>
             <a:fillRect/>
@@ -3699,7 +3658,7 @@
         </p:blipFill>
         <p:spPr>
           <a:xfrm>
-            <a:off x="8302061" y="34005895"/>
+            <a:off x="9166157" y="34929010"/>
             <a:ext cx="5286412" cy="5604281"/>
           </a:xfrm>
           <a:prstGeom prst="rect">
@@ -3731,15 +3690,15 @@
         </p:spPr>
         <p:style>
           <a:lnRef idx="2">
-            <a:schemeClr val="accent4">
+            <a:schemeClr val="accent1">
               <a:shade val="50000"/>
             </a:schemeClr>
           </a:lnRef>
           <a:fillRef idx="1">
-            <a:schemeClr val="accent4"/>
+            <a:schemeClr val="accent1"/>
           </a:fillRef>
           <a:effectRef idx="0">
-            <a:schemeClr val="accent4"/>
+            <a:schemeClr val="accent1"/>
           </a:effectRef>
           <a:fontRef idx="minor">
             <a:schemeClr val="lt1"/>
@@ -3752,7 +3711,7 @@
             <a:pPr algn="ctr"/>
             <a:r>
               <a:rPr lang="en-US" sz="4000" b="1" dirty="0" smtClean="0">
-                <a:latin typeface="Arial" pitchFamily="34" charset="0"/>
+                <a:latin typeface="+mj-lt"/>
                 <a:cs typeface="Arial" pitchFamily="34" charset="0"/>
               </a:rPr>
               <a:t>Co-association</a:t>
@@ -3762,13 +3721,13 @@
             <a:pPr algn="ctr"/>
             <a:r>
               <a:rPr lang="en-US" sz="4000" b="1" dirty="0" smtClean="0">
-                <a:latin typeface="Arial" pitchFamily="34" charset="0"/>
+                <a:latin typeface="+mj-lt"/>
                 <a:cs typeface="Arial" pitchFamily="34" charset="0"/>
               </a:rPr>
               <a:t>matrix</a:t>
             </a:r>
             <a:endParaRPr lang="en-US" sz="4000" b="1" dirty="0">
-              <a:latin typeface="Arial" pitchFamily="34" charset="0"/>
+              <a:latin typeface="+mj-lt"/>
               <a:cs typeface="Arial" pitchFamily="34" charset="0"/>
             </a:endParaRPr>
           </a:p>
@@ -3782,8 +3741,8 @@
         </p:nvSpPr>
         <p:spPr>
           <a:xfrm>
-            <a:off x="4834659" y="29314831"/>
-            <a:ext cx="5318520" cy="2071702"/>
+            <a:off x="3441710" y="29314831"/>
+            <a:ext cx="4272766" cy="2071702"/>
           </a:xfrm>
           <a:prstGeom prst="roundRect">
             <a:avLst/>
@@ -3791,13 +3750,13 @@
         </p:spPr>
         <p:style>
           <a:lnRef idx="2">
-            <a:schemeClr val="accent4"/>
+            <a:schemeClr val="accent1"/>
           </a:lnRef>
           <a:fillRef idx="1">
             <a:schemeClr val="lt1"/>
           </a:fillRef>
           <a:effectRef idx="0">
-            <a:schemeClr val="accent4"/>
+            <a:schemeClr val="accent1"/>
           </a:effectRef>
           <a:fontRef idx="minor">
             <a:schemeClr val="dk1"/>
@@ -3809,8 +3768,8 @@
           <a:p>
             <a:pPr algn="ctr"/>
             <a:r>
-              <a:rPr lang="en-US" sz="3600" dirty="0" smtClean="0">
-                <a:latin typeface="Arial Black" pitchFamily="34" charset="0"/>
+              <a:rPr lang="en-US" sz="3200" b="1" dirty="0" smtClean="0">
+                <a:latin typeface="+mj-lt"/>
                 <a:cs typeface="Arial" pitchFamily="34" charset="0"/>
               </a:rPr>
               <a:t>Solution</a:t>
@@ -3819,21 +3778,14 @@
           <a:p>
             <a:pPr algn="ctr"/>
             <a:r>
-              <a:rPr lang="en-US" sz="3600" dirty="0" smtClean="0">
-                <a:latin typeface="Arial" pitchFamily="34" charset="0"/>
-                <a:cs typeface="Arial" pitchFamily="34" charset="0"/>
-              </a:rPr>
-              <a:t>CSR </a:t>
-            </a:r>
-            <a:r>
-              <a:rPr lang="en-US" sz="3600" dirty="0" smtClean="0">
-                <a:latin typeface="Arial" pitchFamily="34" charset="0"/>
-                <a:cs typeface="Arial" pitchFamily="34" charset="0"/>
-              </a:rPr>
-              <a:t>sparse matrix with optimized building</a:t>
-            </a:r>
-            <a:endParaRPr lang="en-US" sz="3600" dirty="0">
-              <a:latin typeface="Arial" pitchFamily="34" charset="0"/>
+              <a:rPr lang="en-US" sz="3200" dirty="0" smtClean="0">
+                <a:latin typeface="+mj-lt"/>
+                <a:cs typeface="Arial" pitchFamily="34" charset="0"/>
+              </a:rPr>
+              <a:t>CSR sparse matrix with optimized building</a:t>
+            </a:r>
+            <a:endParaRPr lang="en-US" sz="3200" dirty="0">
+              <a:latin typeface="+mj-lt"/>
               <a:cs typeface="Arial" pitchFamily="34" charset="0"/>
             </a:endParaRPr>
           </a:p>
@@ -3897,15 +3849,15 @@
         </p:spPr>
         <p:style>
           <a:lnRef idx="2">
-            <a:schemeClr val="accent6">
+            <a:schemeClr val="accent1">
               <a:shade val="50000"/>
             </a:schemeClr>
           </a:lnRef>
           <a:fillRef idx="1">
-            <a:schemeClr val="accent6"/>
+            <a:schemeClr val="accent1"/>
           </a:fillRef>
           <a:effectRef idx="0">
-            <a:schemeClr val="accent6"/>
+            <a:schemeClr val="accent1"/>
           </a:effectRef>
           <a:fontRef idx="minor">
             <a:schemeClr val="lt1"/>
@@ -3918,13 +3870,13 @@
             <a:pPr algn="ctr"/>
             <a:r>
               <a:rPr lang="en-US" sz="4000" b="1" dirty="0" smtClean="0">
-                <a:latin typeface="Arial" pitchFamily="34" charset="0"/>
-                <a:cs typeface="Arial" pitchFamily="34" charset="0"/>
-              </a:rPr>
-              <a:t>Single-Link</a:t>
+                <a:latin typeface="+mj-lt"/>
+                <a:cs typeface="Arial" pitchFamily="34" charset="0"/>
+              </a:rPr>
+              <a:t>Single-Link (SL)</a:t>
             </a:r>
             <a:endParaRPr lang="en-US" sz="4000" b="1" dirty="0">
-              <a:latin typeface="Arial" pitchFamily="34" charset="0"/>
+              <a:latin typeface="+mj-lt"/>
               <a:cs typeface="Arial" pitchFamily="34" charset="0"/>
             </a:endParaRPr>
           </a:p>
@@ -3947,13 +3899,13 @@
         </p:spPr>
         <p:style>
           <a:lnRef idx="2">
-            <a:schemeClr val="accent6"/>
+            <a:schemeClr val="accent1"/>
           </a:lnRef>
           <a:fillRef idx="1">
             <a:schemeClr val="lt1"/>
           </a:fillRef>
           <a:effectRef idx="0">
-            <a:schemeClr val="accent6"/>
+            <a:schemeClr val="accent1"/>
           </a:effectRef>
           <a:fontRef idx="minor">
             <a:schemeClr val="dk1"/>
@@ -3965,45 +3917,38 @@
           <a:p>
             <a:pPr algn="ctr"/>
             <a:r>
-              <a:rPr lang="en-US" sz="3600" dirty="0">
-                <a:latin typeface="Arial Black" pitchFamily="34" charset="0"/>
+              <a:rPr lang="en-US" sz="3200" b="1" dirty="0">
+                <a:latin typeface="+mj-lt"/>
                 <a:cs typeface="Arial" pitchFamily="34" charset="0"/>
               </a:rPr>
               <a:t>Solution</a:t>
             </a:r>
-            <a:endParaRPr lang="en-US" sz="3600" dirty="0" smtClean="0">
-              <a:latin typeface="Arial" pitchFamily="34" charset="0"/>
+            <a:endParaRPr lang="en-US" sz="3200" b="1" dirty="0" smtClean="0">
+              <a:latin typeface="+mj-lt"/>
               <a:cs typeface="Arial" pitchFamily="34" charset="0"/>
             </a:endParaRPr>
           </a:p>
           <a:p>
             <a:pPr algn="ctr"/>
             <a:r>
-              <a:rPr lang="en-US" sz="3600" dirty="0" smtClean="0">
-                <a:latin typeface="Arial" pitchFamily="34" charset="0"/>
-                <a:cs typeface="Arial" pitchFamily="34" charset="0"/>
-              </a:rPr>
-              <a:t>MST </a:t>
-            </a:r>
-            <a:r>
-              <a:rPr lang="en-US" sz="3600" dirty="0" smtClean="0">
-                <a:latin typeface="Arial" pitchFamily="34" charset="0"/>
-                <a:cs typeface="Arial" pitchFamily="34" charset="0"/>
-              </a:rPr>
-              <a:t>based SL</a:t>
+              <a:rPr lang="en-US" sz="3200" dirty="0" smtClean="0">
+                <a:latin typeface="+mj-lt"/>
+                <a:cs typeface="Arial" pitchFamily="34" charset="0"/>
+              </a:rPr>
+              <a:t>MST based SL</a:t>
             </a:r>
           </a:p>
           <a:p>
             <a:pPr algn="ctr"/>
             <a:r>
-              <a:rPr lang="en-US" sz="3600" dirty="0" smtClean="0">
-                <a:latin typeface="Arial" pitchFamily="34" charset="0"/>
+              <a:rPr lang="en-US" sz="3200" dirty="0" smtClean="0">
+                <a:latin typeface="+mj-lt"/>
                 <a:cs typeface="Arial" pitchFamily="34" charset="0"/>
               </a:rPr>
               <a:t>MST disk-based SL</a:t>
             </a:r>
-            <a:endParaRPr lang="en-US" sz="3600" dirty="0">
-              <a:latin typeface="Arial" pitchFamily="34" charset="0"/>
+            <a:endParaRPr lang="en-US" sz="3200" dirty="0">
+              <a:latin typeface="+mj-lt"/>
               <a:cs typeface="Arial" pitchFamily="34" charset="0"/>
             </a:endParaRPr>
           </a:p>
@@ -4102,20 +4047,20 @@
               <a:pPr algn="ctr"/>
               <a:r>
                 <a:rPr lang="en-US" sz="4000" b="1" dirty="0" smtClean="0">
-                  <a:latin typeface="Arial" pitchFamily="34" charset="0"/>
+                  <a:latin typeface="+mj-lt"/>
                   <a:cs typeface="Arial" pitchFamily="34" charset="0"/>
                 </a:rPr>
                 <a:t>Partition </a:t>
               </a:r>
               <a:r>
                 <a:rPr lang="en-US" sz="4000" b="1" i="1" dirty="0" smtClean="0">
-                  <a:latin typeface="Arial" pitchFamily="34" charset="0"/>
+                  <a:latin typeface="+mj-lt"/>
                   <a:cs typeface="Arial" pitchFamily="34" charset="0"/>
                 </a:rPr>
                 <a:t>1</a:t>
               </a:r>
               <a:endParaRPr lang="en-US" sz="4000" b="1" i="1" dirty="0">
-                <a:latin typeface="Arial" pitchFamily="34" charset="0"/>
+                <a:latin typeface="+mj-lt"/>
                 <a:cs typeface="Arial" pitchFamily="34" charset="0"/>
               </a:endParaRPr>
             </a:p>
@@ -4159,20 +4104,20 @@
               <a:pPr algn="ctr"/>
               <a:r>
                 <a:rPr lang="en-US" sz="4000" b="1" dirty="0" smtClean="0">
-                  <a:latin typeface="Arial" pitchFamily="34" charset="0"/>
+                  <a:latin typeface="+mj-lt"/>
                   <a:cs typeface="Arial" pitchFamily="34" charset="0"/>
                 </a:rPr>
                 <a:t>Partition </a:t>
               </a:r>
               <a:r>
                 <a:rPr lang="en-US" sz="4000" b="1" i="1" dirty="0" smtClean="0">
-                  <a:latin typeface="Arial" pitchFamily="34" charset="0"/>
+                  <a:latin typeface="+mj-lt"/>
                   <a:cs typeface="Arial" pitchFamily="34" charset="0"/>
                 </a:rPr>
                 <a:t>P</a:t>
               </a:r>
               <a:endParaRPr lang="en-US" sz="4000" b="1" i="1" dirty="0">
-                <a:latin typeface="Arial" pitchFamily="34" charset="0"/>
+                <a:latin typeface="+mj-lt"/>
                 <a:cs typeface="Arial" pitchFamily="34" charset="0"/>
               </a:endParaRPr>
             </a:p>
@@ -4192,6 +4137,11 @@
             <a:prstGeom prst="ellipse">
               <a:avLst/>
             </a:prstGeom>
+            <a:solidFill>
+              <a:schemeClr val="tx2">
+                <a:lumMod val="75000"/>
+              </a:schemeClr>
+            </a:solidFill>
           </p:spPr>
           <p:style>
             <a:lnRef idx="2">
@@ -4215,7 +4165,7 @@
             <a:p>
               <a:pPr algn="ctr"/>
               <a:endParaRPr lang="en-US" sz="6000">
-                <a:latin typeface="Arial" pitchFamily="34" charset="0"/>
+                <a:latin typeface="+mj-lt"/>
                 <a:cs typeface="Arial" pitchFamily="34" charset="0"/>
               </a:endParaRPr>
             </a:p>
@@ -4235,6 +4185,11 @@
             <a:prstGeom prst="ellipse">
               <a:avLst/>
             </a:prstGeom>
+            <a:solidFill>
+              <a:schemeClr val="tx2">
+                <a:lumMod val="75000"/>
+              </a:schemeClr>
+            </a:solidFill>
           </p:spPr>
           <p:style>
             <a:lnRef idx="2">
@@ -4258,7 +4213,7 @@
             <a:p>
               <a:pPr algn="ctr"/>
               <a:endParaRPr lang="en-US" sz="6000">
-                <a:latin typeface="Arial" pitchFamily="34" charset="0"/>
+                <a:latin typeface="+mj-lt"/>
                 <a:cs typeface="Arial" pitchFamily="34" charset="0"/>
               </a:endParaRPr>
             </a:p>
@@ -4278,6 +4233,11 @@
             <a:prstGeom prst="ellipse">
               <a:avLst/>
             </a:prstGeom>
+            <a:solidFill>
+              <a:schemeClr val="tx2">
+                <a:lumMod val="75000"/>
+              </a:schemeClr>
+            </a:solidFill>
           </p:spPr>
           <p:style>
             <a:lnRef idx="2">
@@ -4301,47 +4261,13 @@
             <a:p>
               <a:pPr algn="ctr"/>
               <a:endParaRPr lang="en-US" sz="6000">
-                <a:latin typeface="Arial" pitchFamily="34" charset="0"/>
+                <a:latin typeface="+mj-lt"/>
                 <a:cs typeface="Arial" pitchFamily="34" charset="0"/>
               </a:endParaRPr>
             </a:p>
           </p:txBody>
         </p:sp>
       </p:grpSp>
-      <p:pic>
-        <p:nvPicPr>
-          <p:cNvPr id="51" name="Imagem 50" descr="kmin_evolution.png"/>
-          <p:cNvPicPr>
-            <a:picLocks noChangeAspect="1"/>
-          </p:cNvPicPr>
-          <p:nvPr/>
-        </p:nvPicPr>
-        <p:blipFill>
-          <a:blip r:embed="rId7"/>
-          <a:stretch>
-            <a:fillRect/>
-          </a:stretch>
-        </p:blipFill>
-        <p:spPr>
-          <a:xfrm>
-            <a:off x="20954379" y="17706846"/>
-            <a:ext cx="7530195" cy="4811626"/>
-          </a:xfrm>
-          <a:prstGeom prst="rect">
-            <a:avLst/>
-          </a:prstGeom>
-          <a:ln>
-            <a:noFill/>
-          </a:ln>
-          <a:effectLst>
-            <a:outerShdw blurRad="190500" algn="tl" rotWithShape="0">
-              <a:srgbClr val="000000">
-                <a:alpha val="70000"/>
-              </a:srgbClr>
-            </a:outerShdw>
-          </a:effectLst>
-        </p:spPr>
-      </p:pic>
       <p:sp>
         <p:nvSpPr>
           <p:cNvPr id="2" name="Rectângulo 1"/>
@@ -4358,14 +4284,14 @@
           </a:prstGeom>
         </p:spPr>
         <p:style>
-          <a:lnRef idx="1">
-            <a:schemeClr val="dk1"/>
+          <a:lnRef idx="2">
+            <a:schemeClr val="accent1"/>
           </a:lnRef>
-          <a:fillRef idx="2">
-            <a:schemeClr val="dk1"/>
+          <a:fillRef idx="1">
+            <a:schemeClr val="lt1"/>
           </a:fillRef>
-          <a:effectRef idx="1">
-            <a:schemeClr val="dk1"/>
+          <a:effectRef idx="0">
+            <a:schemeClr val="accent1"/>
           </a:effectRef>
           <a:fontRef idx="minor">
             <a:schemeClr val="dk1"/>
@@ -4377,8 +4303,8 @@
           <a:p>
             <a:pPr algn="just"/>
             <a:r>
-              <a:rPr lang="en-US" sz="6600" cap="small" dirty="0">
-                <a:latin typeface="Arial Black" pitchFamily="34" charset="0"/>
+              <a:rPr lang="en-US" sz="6600" b="1" cap="small" dirty="0">
+                <a:latin typeface="+mj-lt"/>
                 <a:cs typeface="Arial" pitchFamily="34" charset="0"/>
               </a:rPr>
               <a:t>Introduction</a:t>
@@ -4394,10 +4320,38 @@
             </a:pPr>
             <a:r>
               <a:rPr lang="en-US" sz="4000" dirty="0">
-                <a:latin typeface="Arial" pitchFamily="34" charset="0"/>
-                <a:cs typeface="Arial" pitchFamily="34" charset="0"/>
-              </a:rPr>
-              <a:t>EAC is robust but its computational complexity restricts is use to small datasets.</a:t>
+                <a:latin typeface="+mj-lt"/>
+                <a:cs typeface="Arial" pitchFamily="34" charset="0"/>
+              </a:rPr>
+              <a:t>EAC is </a:t>
+            </a:r>
+            <a:r>
+              <a:rPr lang="en-US" sz="4000" dirty="0" smtClean="0">
+                <a:latin typeface="+mj-lt"/>
+                <a:cs typeface="Arial" pitchFamily="34" charset="0"/>
+              </a:rPr>
+              <a:t>a robust ensemble method but </a:t>
+            </a:r>
+            <a:r>
+              <a:rPr lang="en-US" sz="4000" dirty="0">
+                <a:latin typeface="+mj-lt"/>
+                <a:cs typeface="Arial" pitchFamily="34" charset="0"/>
+              </a:rPr>
+              <a:t>its computational complexity restricts </a:t>
+            </a:r>
+            <a:r>
+              <a:rPr lang="en-US" sz="4000" dirty="0" smtClean="0">
+                <a:latin typeface="+mj-lt"/>
+                <a:cs typeface="Arial" pitchFamily="34" charset="0"/>
+              </a:rPr>
+              <a:t>its </a:t>
+            </a:r>
+            <a:r>
+              <a:rPr lang="en-US" sz="4000" dirty="0">
+                <a:latin typeface="+mj-lt"/>
+                <a:cs typeface="Arial" pitchFamily="34" charset="0"/>
+              </a:rPr>
+              <a:t>use to small datasets.</a:t>
             </a:r>
           </a:p>
           <a:p>
@@ -4410,7 +4364,7 @@
             </a:pPr>
             <a:r>
               <a:rPr lang="en-US" sz="4000" dirty="0">
-                <a:latin typeface="Arial" pitchFamily="34" charset="0"/>
+                <a:latin typeface="+mj-lt"/>
                 <a:cs typeface="Arial" pitchFamily="34" charset="0"/>
               </a:rPr>
               <a:t>We propose an optimized implementation of the different EAC steps for faster execution and decreased memory usage.</a:t>
@@ -4418,7 +4372,9 @@
           </a:p>
           <a:p>
             <a:pPr algn="ctr"/>
-            <a:endParaRPr lang="en-US" sz="4800" dirty="0"/>
+            <a:endParaRPr lang="en-US" sz="4800" dirty="0">
+              <a:latin typeface="+mj-lt"/>
+            </a:endParaRPr>
           </a:p>
         </p:txBody>
       </p:sp>
@@ -4438,14 +4394,14 @@
           </a:prstGeom>
         </p:spPr>
         <p:style>
-          <a:lnRef idx="1">
-            <a:schemeClr val="dk1"/>
+          <a:lnRef idx="2">
+            <a:schemeClr val="accent1"/>
           </a:lnRef>
-          <a:fillRef idx="2">
-            <a:schemeClr val="dk1"/>
+          <a:fillRef idx="1">
+            <a:schemeClr val="lt1"/>
           </a:fillRef>
-          <a:effectRef idx="1">
-            <a:schemeClr val="dk1"/>
+          <a:effectRef idx="0">
+            <a:schemeClr val="accent1"/>
           </a:effectRef>
           <a:fontRef idx="minor">
             <a:schemeClr val="dk1"/>
@@ -4457,8 +4413,8 @@
           <a:p>
             <a:pPr algn="just"/>
             <a:r>
-              <a:rPr lang="en-US" sz="6600" cap="small" dirty="0">
-                <a:latin typeface="Arial Black" pitchFamily="34" charset="0"/>
+              <a:rPr lang="en-US" sz="6600" b="1" cap="small" dirty="0">
+                <a:latin typeface="+mj-lt"/>
                 <a:cs typeface="Arial" pitchFamily="34" charset="0"/>
               </a:rPr>
               <a:t>Validation and Speed-up</a:t>
@@ -4474,20 +4430,20 @@
             </a:pPr>
             <a:r>
               <a:rPr lang="en-US" sz="4000" dirty="0">
-                <a:latin typeface="Arial" pitchFamily="34" charset="0"/>
+                <a:latin typeface="+mj-lt"/>
                 <a:cs typeface="Arial" pitchFamily="34" charset="0"/>
               </a:rPr>
               <a:t>The clustering accuracy of the optimized version relative to the original on several small benchmark datasets is </a:t>
             </a:r>
             <a:r>
               <a:rPr lang="en-US" sz="4000" dirty="0" smtClean="0">
-                <a:latin typeface="Arial" pitchFamily="34" charset="0"/>
-                <a:cs typeface="Arial" pitchFamily="34" charset="0"/>
-              </a:rPr>
-              <a:t>negligible.</a:t>
+                <a:latin typeface="+mj-lt"/>
+                <a:cs typeface="Arial" pitchFamily="34" charset="0"/>
+              </a:rPr>
+              <a:t>negligible, validating its use on large datasets.</a:t>
             </a:r>
             <a:endParaRPr lang="en-US" sz="4000" dirty="0">
-              <a:latin typeface="Arial" pitchFamily="34" charset="0"/>
+              <a:latin typeface="+mj-lt"/>
               <a:cs typeface="Arial" pitchFamily="34" charset="0"/>
             </a:endParaRPr>
           </a:p>
@@ -4501,7 +4457,7 @@
             </a:pPr>
             <a:r>
               <a:rPr lang="en-US" sz="4000" dirty="0">
-                <a:latin typeface="Arial" pitchFamily="34" charset="0"/>
+                <a:latin typeface="+mj-lt"/>
                 <a:cs typeface="Arial" pitchFamily="34" charset="0"/>
               </a:rPr>
               <a:t>Speed-up over the original version on small datasets varied between 6 and 200 on the different EAC phases.</a:t>
@@ -4518,21 +4474,21 @@
         <p:spPr>
           <a:xfrm>
             <a:off x="21887015" y="7561464"/>
-            <a:ext cx="7927820" cy="6332634"/>
+            <a:ext cx="7927820" cy="8724262"/>
           </a:xfrm>
           <a:prstGeom prst="rect">
             <a:avLst/>
           </a:prstGeom>
         </p:spPr>
         <p:style>
-          <a:lnRef idx="1">
-            <a:schemeClr val="dk1"/>
+          <a:lnRef idx="2">
+            <a:schemeClr val="accent1"/>
           </a:lnRef>
-          <a:fillRef idx="2">
-            <a:schemeClr val="dk1"/>
+          <a:fillRef idx="1">
+            <a:schemeClr val="lt1"/>
           </a:fillRef>
-          <a:effectRef idx="1">
-            <a:schemeClr val="dk1"/>
+          <a:effectRef idx="0">
+            <a:schemeClr val="accent1"/>
           </a:effectRef>
           <a:fontRef idx="minor">
             <a:schemeClr val="dk1"/>
@@ -4544,8 +4500,8 @@
           <a:p>
             <a:pPr algn="just"/>
             <a:r>
-              <a:rPr lang="en-US" sz="6600" cap="small" dirty="0">
-                <a:latin typeface="Arial Black" pitchFamily="34" charset="0"/>
+              <a:rPr lang="en-US" sz="6600" b="1" cap="small" dirty="0">
+                <a:latin typeface="+mj-lt"/>
                 <a:cs typeface="Arial" pitchFamily="34" charset="0"/>
               </a:rPr>
               <a:t>Rules</a:t>
@@ -4555,65 +4511,27 @@
             <a:pPr algn="just"/>
             <a:r>
               <a:rPr lang="en-US" sz="4000" dirty="0" smtClean="0">
-                <a:latin typeface="Arial" pitchFamily="34" charset="0"/>
-                <a:cs typeface="Arial" pitchFamily="34" charset="0"/>
-              </a:rPr>
-              <a:t>Four rules for the minimum and maximum number of clusters of the ensemble:</a:t>
-            </a:r>
-          </a:p>
-          <a:p>
-            <a:pPr algn="just"/>
+                <a:latin typeface="+mj-lt"/>
+                <a:cs typeface="Arial" pitchFamily="34" charset="0"/>
+              </a:rPr>
+              <a:t>Four rules for the minimum and maximum number of clusters of the </a:t>
+            </a:r>
             <a:r>
               <a:rPr lang="en-US" sz="4000" dirty="0" smtClean="0">
-                <a:latin typeface="Arial" pitchFamily="34" charset="0"/>
-                <a:cs typeface="Arial" pitchFamily="34" charset="0"/>
-              </a:rPr>
-              <a:t>Name </a:t>
-            </a:r>
-            <a:r>
-              <a:rPr lang="en-US" sz="4000" dirty="0" err="1" smtClean="0">
-                <a:latin typeface="Arial" pitchFamily="34" charset="0"/>
-                <a:cs typeface="Arial" pitchFamily="34" charset="0"/>
-              </a:rPr>
-              <a:t>K</a:t>
-            </a:r>
-            <a:r>
-              <a:rPr lang="en-US" sz="4000" baseline="-25000" dirty="0" err="1" smtClean="0">
-                <a:latin typeface="Arial" pitchFamily="34" charset="0"/>
-                <a:cs typeface="Arial" pitchFamily="34" charset="0"/>
-              </a:rPr>
-              <a:t>min</a:t>
-            </a:r>
-            <a:r>
-              <a:rPr lang="en-US" sz="4000" dirty="0" smtClean="0">
-                <a:latin typeface="Arial" pitchFamily="34" charset="0"/>
-                <a:cs typeface="Arial" pitchFamily="34" charset="0"/>
-              </a:rPr>
-              <a:t> </a:t>
-            </a:r>
-            <a:r>
-              <a:rPr lang="en-US" sz="4000" dirty="0" err="1" smtClean="0">
-                <a:latin typeface="Arial" pitchFamily="34" charset="0"/>
-                <a:cs typeface="Arial" pitchFamily="34" charset="0"/>
-              </a:rPr>
-              <a:t>K</a:t>
-            </a:r>
-            <a:r>
-              <a:rPr lang="en-US" sz="4000" baseline="-25000" dirty="0" err="1" smtClean="0">
-                <a:latin typeface="Arial" pitchFamily="34" charset="0"/>
-                <a:cs typeface="Arial" pitchFamily="34" charset="0"/>
-              </a:rPr>
-              <a:t>max</a:t>
+                <a:latin typeface="+mj-lt"/>
+                <a:cs typeface="Arial" pitchFamily="34" charset="0"/>
+              </a:rPr>
+              <a:t>ensemble were tested.</a:t>
             </a:r>
             <a:endParaRPr lang="en-US" sz="4000" dirty="0" smtClean="0">
-              <a:latin typeface="Arial" pitchFamily="34" charset="0"/>
+              <a:latin typeface="+mj-lt"/>
               <a:cs typeface="Arial" pitchFamily="34" charset="0"/>
             </a:endParaRPr>
           </a:p>
           <a:p>
             <a:pPr algn="just"/>
             <a:endParaRPr lang="en-US" sz="8800" cap="small" dirty="0">
-              <a:latin typeface="Arial Black" pitchFamily="34" charset="0"/>
+              <a:latin typeface="+mj-lt"/>
               <a:cs typeface="Arial" pitchFamily="34" charset="0"/>
             </a:endParaRPr>
           </a:p>
@@ -4627,22 +4545,22 @@
         </p:nvSpPr>
         <p:spPr>
           <a:xfrm>
-            <a:off x="18725230" y="35141916"/>
-            <a:ext cx="11312294" cy="6332634"/>
+            <a:off x="20378314" y="33987753"/>
+            <a:ext cx="9659209" cy="7486797"/>
           </a:xfrm>
           <a:prstGeom prst="rect">
             <a:avLst/>
           </a:prstGeom>
         </p:spPr>
         <p:style>
-          <a:lnRef idx="1">
-            <a:schemeClr val="dk1"/>
+          <a:lnRef idx="2">
+            <a:schemeClr val="accent1"/>
           </a:lnRef>
-          <a:fillRef idx="2">
-            <a:schemeClr val="dk1"/>
+          <a:fillRef idx="1">
+            <a:schemeClr val="lt1"/>
           </a:fillRef>
-          <a:effectRef idx="1">
-            <a:schemeClr val="dk1"/>
+          <a:effectRef idx="0">
+            <a:schemeClr val="accent1"/>
           </a:effectRef>
           <a:fontRef idx="minor">
             <a:schemeClr val="dk1"/>
@@ -4654,8 +4572,8 @@
           <a:p>
             <a:pPr algn="just"/>
             <a:r>
-              <a:rPr lang="en-US" sz="6600" cap="small" dirty="0">
-                <a:latin typeface="Arial Black" pitchFamily="34" charset="0"/>
+              <a:rPr lang="en-US" sz="6600" b="1" cap="small" dirty="0">
+                <a:latin typeface="+mj-lt"/>
                 <a:cs typeface="Arial" pitchFamily="34" charset="0"/>
               </a:rPr>
               <a:t>Conclusions</a:t>
@@ -4668,7 +4586,7 @@
             </a:pPr>
             <a:r>
               <a:rPr lang="en-US" sz="4800" dirty="0">
-                <a:latin typeface="Arial" pitchFamily="34" charset="0"/>
+                <a:latin typeface="+mj-lt"/>
                 <a:cs typeface="Arial" pitchFamily="34" charset="0"/>
               </a:rPr>
               <a:t>EAC is now applicable to a wider spectrum of datasets.</a:t>
@@ -4681,7 +4599,7 @@
             </a:pPr>
             <a:r>
               <a:rPr lang="en-US" sz="4800" dirty="0">
-                <a:latin typeface="Arial" pitchFamily="34" charset="0"/>
+                <a:latin typeface="+mj-lt"/>
                 <a:cs typeface="Arial" pitchFamily="34" charset="0"/>
               </a:rPr>
               <a:t>Speed-up from 6 to 200 compared to original implementation on the different phases.</a:t>
@@ -4697,8 +4615,8 @@
         </p:nvSpPr>
         <p:spPr>
           <a:xfrm>
-            <a:off x="5231169" y="16024116"/>
-            <a:ext cx="4525499" cy="1767432"/>
+            <a:off x="4477469" y="15402010"/>
+            <a:ext cx="4022376" cy="1767432"/>
           </a:xfrm>
           <a:prstGeom prst="roundRect">
             <a:avLst/>
@@ -4724,8 +4642,8 @@
           <a:p>
             <a:pPr algn="ctr"/>
             <a:r>
-              <a:rPr lang="en-US" sz="3600" dirty="0" smtClean="0">
-                <a:latin typeface="Arial Black" pitchFamily="34" charset="0"/>
+              <a:rPr lang="en-US" sz="3200" b="1" dirty="0" smtClean="0">
+                <a:latin typeface="+mj-lt"/>
                 <a:cs typeface="Arial" pitchFamily="34" charset="0"/>
               </a:rPr>
               <a:t>Challenge</a:t>
@@ -4734,14 +4652,14 @@
           <a:p>
             <a:pPr algn="ctr"/>
             <a:r>
-              <a:rPr lang="en-US" sz="3600" dirty="0" smtClean="0">
-                <a:latin typeface="Arial" pitchFamily="34" charset="0"/>
+              <a:rPr lang="en-US" sz="3200" dirty="0" smtClean="0">
+                <a:latin typeface="+mj-lt"/>
                 <a:cs typeface="Arial" pitchFamily="34" charset="0"/>
               </a:rPr>
               <a:t>Fast generation of ensemble.</a:t>
             </a:r>
-            <a:endParaRPr lang="en-US" sz="3600" dirty="0">
-              <a:latin typeface="Arial" pitchFamily="34" charset="0"/>
+            <a:endParaRPr lang="en-US" sz="3200" dirty="0">
+              <a:latin typeface="+mj-lt"/>
               <a:cs typeface="Arial" pitchFamily="34" charset="0"/>
             </a:endParaRPr>
           </a:p>
@@ -4755,8 +4673,8 @@
         </p:nvSpPr>
         <p:spPr>
           <a:xfrm>
-            <a:off x="5493824" y="25189717"/>
-            <a:ext cx="4056885" cy="2017461"/>
+            <a:off x="4205016" y="24024678"/>
+            <a:ext cx="2851819" cy="2017461"/>
           </a:xfrm>
           <a:prstGeom prst="roundRect">
             <a:avLst/>
@@ -4764,13 +4682,13 @@
         </p:spPr>
         <p:style>
           <a:lnRef idx="2">
-            <a:schemeClr val="accent4"/>
+            <a:schemeClr val="accent1"/>
           </a:lnRef>
           <a:fillRef idx="1">
             <a:schemeClr val="lt1"/>
           </a:fillRef>
           <a:effectRef idx="0">
-            <a:schemeClr val="accent4"/>
+            <a:schemeClr val="accent1"/>
           </a:effectRef>
           <a:fontRef idx="minor">
             <a:schemeClr val="dk1"/>
@@ -4782,8 +4700,8 @@
           <a:p>
             <a:pPr algn="ctr"/>
             <a:r>
-              <a:rPr lang="en-US" sz="3600" dirty="0" smtClean="0">
-                <a:latin typeface="Arial Black" pitchFamily="34" charset="0"/>
+              <a:rPr lang="en-US" sz="3200" b="1" dirty="0" smtClean="0">
+                <a:latin typeface="+mj-lt"/>
                 <a:cs typeface="Arial" pitchFamily="34" charset="0"/>
               </a:rPr>
               <a:t>Challenge</a:t>
@@ -4792,28 +4710,28 @@
           <a:p>
             <a:pPr algn="ctr"/>
             <a:r>
-              <a:rPr lang="en-US" sz="3600" dirty="0" smtClean="0">
-                <a:latin typeface="Arial" pitchFamily="34" charset="0"/>
+              <a:rPr lang="en-US" sz="3200" dirty="0" smtClean="0">
+                <a:latin typeface="+mj-lt"/>
                 <a:cs typeface="Arial" pitchFamily="34" charset="0"/>
               </a:rPr>
               <a:t>O(n</a:t>
             </a:r>
             <a:r>
-              <a:rPr lang="en-US" sz="3600" baseline="30000" dirty="0" smtClean="0">
-                <a:latin typeface="Arial" pitchFamily="34" charset="0"/>
+              <a:rPr lang="en-US" sz="3200" baseline="30000" dirty="0" smtClean="0">
+                <a:latin typeface="+mj-lt"/>
                 <a:cs typeface="Arial" pitchFamily="34" charset="0"/>
               </a:rPr>
               <a:t>2</a:t>
             </a:r>
             <a:r>
-              <a:rPr lang="en-US" sz="3600" dirty="0" smtClean="0">
-                <a:latin typeface="Arial" pitchFamily="34" charset="0"/>
+              <a:rPr lang="en-US" sz="3200" dirty="0" smtClean="0">
+                <a:latin typeface="+mj-lt"/>
                 <a:cs typeface="Arial" pitchFamily="34" charset="0"/>
               </a:rPr>
               <a:t>) space complexity</a:t>
             </a:r>
-            <a:endParaRPr lang="en-US" sz="3600" dirty="0">
-              <a:latin typeface="Arial" pitchFamily="34" charset="0"/>
+            <a:endParaRPr lang="en-US" sz="3200" dirty="0">
+              <a:latin typeface="+mj-lt"/>
               <a:cs typeface="Arial" pitchFamily="34" charset="0"/>
             </a:endParaRPr>
           </a:p>
@@ -4836,13 +4754,13 @@
         </p:spPr>
         <p:style>
           <a:lnRef idx="2">
-            <a:schemeClr val="accent6"/>
+            <a:schemeClr val="accent1"/>
           </a:lnRef>
           <a:fillRef idx="1">
             <a:schemeClr val="lt1"/>
           </a:fillRef>
           <a:effectRef idx="0">
-            <a:schemeClr val="accent6"/>
+            <a:schemeClr val="accent1"/>
           </a:effectRef>
           <a:fontRef idx="minor">
             <a:schemeClr val="dk1"/>
@@ -4854,8 +4772,8 @@
           <a:p>
             <a:pPr algn="ctr"/>
             <a:r>
-              <a:rPr lang="en-US" sz="3600" dirty="0" smtClean="0">
-                <a:latin typeface="Arial Black" pitchFamily="34" charset="0"/>
+              <a:rPr lang="en-US" sz="3200" b="1" dirty="0" smtClean="0">
+                <a:latin typeface="+mj-lt"/>
                 <a:cs typeface="Arial" pitchFamily="34" charset="0"/>
               </a:rPr>
               <a:t>Challenge</a:t>
@@ -4864,28 +4782,28 @@
           <a:p>
             <a:pPr algn="ctr"/>
             <a:r>
-              <a:rPr lang="en-US" sz="3600" dirty="0" smtClean="0">
-                <a:latin typeface="Arial" pitchFamily="34" charset="0"/>
+              <a:rPr lang="en-US" sz="3200" dirty="0" smtClean="0">
+                <a:latin typeface="+mj-lt"/>
                 <a:cs typeface="Arial" pitchFamily="34" charset="0"/>
               </a:rPr>
               <a:t>O(n</a:t>
             </a:r>
             <a:r>
-              <a:rPr lang="en-US" sz="3600" baseline="30000" dirty="0" smtClean="0">
-                <a:latin typeface="Arial" pitchFamily="34" charset="0"/>
+              <a:rPr lang="en-US" sz="3200" baseline="30000" dirty="0" smtClean="0">
+                <a:latin typeface="+mj-lt"/>
                 <a:cs typeface="Arial" pitchFamily="34" charset="0"/>
               </a:rPr>
               <a:t>2</a:t>
             </a:r>
             <a:r>
-              <a:rPr lang="en-US" sz="3600" dirty="0" smtClean="0">
-                <a:latin typeface="Arial" pitchFamily="34" charset="0"/>
+              <a:rPr lang="en-US" sz="3200" dirty="0" smtClean="0">
+                <a:latin typeface="+mj-lt"/>
                 <a:cs typeface="Arial" pitchFamily="34" charset="0"/>
               </a:rPr>
               <a:t>) space complexity</a:t>
             </a:r>
-            <a:endParaRPr lang="en-US" sz="3600" dirty="0">
-              <a:latin typeface="Arial" pitchFamily="34" charset="0"/>
+            <a:endParaRPr lang="en-US" sz="3200" dirty="0">
+              <a:latin typeface="+mj-lt"/>
               <a:cs typeface="Arial" pitchFamily="34" charset="0"/>
             </a:endParaRPr>
           </a:p>
@@ -4900,7 +4818,7 @@
         <p:spPr>
           <a:xfrm>
             <a:off x="1860413" y="15121657"/>
-            <a:ext cx="26522637" cy="0"/>
+            <a:ext cx="19445380" cy="0"/>
           </a:xfrm>
           <a:prstGeom prst="line">
             <a:avLst/>
@@ -4928,6 +4846,40 @@
           </a:fontRef>
         </p:style>
       </p:cxnSp>
+      <p:pic>
+        <p:nvPicPr>
+          <p:cNvPr id="51" name="Imagem 50" descr="kmin_evolution.png"/>
+          <p:cNvPicPr>
+            <a:picLocks noChangeAspect="1"/>
+          </p:cNvPicPr>
+          <p:nvPr/>
+        </p:nvPicPr>
+        <p:blipFill>
+          <a:blip r:embed="rId6"/>
+          <a:stretch>
+            <a:fillRect/>
+          </a:stretch>
+        </p:blipFill>
+        <p:spPr>
+          <a:xfrm>
+            <a:off x="22517634" y="11358166"/>
+            <a:ext cx="6688734" cy="4273951"/>
+          </a:xfrm>
+          <a:prstGeom prst="rect">
+            <a:avLst/>
+          </a:prstGeom>
+          <a:ln>
+            <a:noFill/>
+          </a:ln>
+          <a:effectLst>
+            <a:outerShdw blurRad="190500" algn="tl" rotWithShape="0">
+              <a:srgbClr val="000000">
+                <a:alpha val="70000"/>
+              </a:srgbClr>
+            </a:outerShdw>
+          </a:effectLst>
+        </p:spPr>
+      </p:pic>
       <p:sp>
         <p:nvSpPr>
           <p:cNvPr id="15" name="CaixaDeTexto 14"/>
@@ -4951,21 +4903,21 @@
           <a:lstStyle/>
           <a:p>
             <a:r>
-              <a:rPr lang="en-US" sz="6000" cap="all" dirty="0">
-                <a:latin typeface="Arial Black" pitchFamily="34" charset="0"/>
+              <a:rPr lang="en-US" sz="6000" b="1" cap="all" dirty="0">
+                <a:latin typeface="+mj-lt"/>
                 <a:cs typeface="Arial" pitchFamily="34" charset="0"/>
               </a:rPr>
               <a:t>Production of </a:t>
             </a:r>
             <a:r>
-              <a:rPr lang="en-US" sz="6000" cap="all" dirty="0" smtClean="0">
-                <a:latin typeface="Arial Black" pitchFamily="34" charset="0"/>
+              <a:rPr lang="en-US" sz="6000" b="1" cap="all" dirty="0" smtClean="0">
+                <a:latin typeface="+mj-lt"/>
                 <a:cs typeface="Arial" pitchFamily="34" charset="0"/>
               </a:rPr>
               <a:t>ensemble</a:t>
             </a:r>
-            <a:endParaRPr lang="en-US" sz="6000" cap="all" dirty="0">
-              <a:latin typeface="Arial Black" pitchFamily="34" charset="0"/>
+            <a:endParaRPr lang="en-US" sz="6000" b="1" cap="all" dirty="0">
+              <a:latin typeface="+mj-lt"/>
               <a:cs typeface="Arial" pitchFamily="34" charset="0"/>
             </a:endParaRPr>
           </a:p>
@@ -4995,8 +4947,8 @@
           <a:p>
             <a:pPr algn="ctr"/>
             <a:r>
-              <a:rPr lang="en-US" sz="6000" cap="all" dirty="0">
-                <a:latin typeface="Arial Black" pitchFamily="34" charset="0"/>
+              <a:rPr lang="en-US" sz="6000" b="1" cap="all" dirty="0">
+                <a:latin typeface="+mj-lt"/>
                 <a:cs typeface="Arial" pitchFamily="34" charset="0"/>
               </a:rPr>
               <a:t>Combination of partitions</a:t>
@@ -5028,16 +4980,12 @@
           <a:p>
             <a:pPr algn="ctr"/>
             <a:r>
-              <a:rPr lang="en-US" sz="6000" cap="all" dirty="0">
-                <a:latin typeface="Arial Black" pitchFamily="34" charset="0"/>
+              <a:rPr lang="en-US" sz="6000" b="1" cap="all" dirty="0">
+                <a:latin typeface="+mj-lt"/>
                 <a:cs typeface="Arial" pitchFamily="34" charset="0"/>
               </a:rPr>
               <a:t>Recovery of final partition</a:t>
             </a:r>
-            <a:endParaRPr lang="en-US" sz="6000" cap="all" dirty="0">
-              <a:latin typeface="Arial Black" pitchFamily="34" charset="0"/>
-              <a:cs typeface="Arial" pitchFamily="34" charset="0"/>
-            </a:endParaRPr>
           </a:p>
         </p:txBody>
       </p:sp>
@@ -5126,14 +5074,14 @@
               <p:nvPr>
                 <p:extLst>
                   <p:ext uri="{D42A27DB-BD31-4B8C-83A1-F6EECF244321}">
-                    <p14:modId xmlns:p14="http://schemas.microsoft.com/office/powerpoint/2010/main" val="3074610803"/>
+                    <p14:modId xmlns:p14="http://schemas.microsoft.com/office/powerpoint/2010/main" val="3892515991"/>
                   </p:ext>
                 </p:extLst>
               </p:nvPr>
             </p:nvGraphicFramePr>
             <p:xfrm>
-              <a:off x="22122170" y="11377241"/>
-              <a:ext cx="7692664" cy="5994337"/>
+              <a:off x="30320374" y="8132214"/>
+              <a:ext cx="7692664" cy="6252684"/>
             </p:xfrm>
             <a:graphic>
               <a:graphicData uri="http://schemas.openxmlformats.org/drawingml/2006/table">
@@ -5146,7 +5094,7 @@
                     <a:gridCol w="3043805"/>
                     <a:gridCol w="1605054"/>
                   </a:tblGrid>
-                  <a:tr h="370840">
+                  <a:tr h="731254">
                     <a:tc>
                       <a:txBody>
                         <a:bodyPr/>
@@ -5230,7 +5178,7 @@
                       <a:tcPr/>
                     </a:tc>
                   </a:tr>
-                  <a:tr h="370840">
+                  <a:tr h="1416539">
                     <a:tc>
                       <a:txBody>
                         <a:bodyPr/>
@@ -5250,6 +5198,7 @@
                         <a:bodyPr/>
                         <a:lstStyle/>
                         <a:p>
+                          <a:pPr/>
                           <a14:m>
                             <m:oMathPara xmlns:m="http://schemas.openxmlformats.org/officeDocument/2006/math">
                               <m:oMathParaPr>
@@ -5302,6 +5251,7 @@
                         <a:bodyPr/>
                         <a:lstStyle/>
                         <a:p>
+                          <a:pPr/>
                           <a14:m>
                             <m:oMathPara xmlns:m="http://schemas.openxmlformats.org/officeDocument/2006/math">
                               <m:oMathParaPr>
@@ -5331,7 +5281,7 @@
                       <a:tcPr/>
                     </a:tc>
                   </a:tr>
-                  <a:tr h="370840">
+                  <a:tr h="778679">
                     <a:tc>
                       <a:txBody>
                         <a:bodyPr/>
@@ -5454,7 +5404,7 @@
                       <a:tcPr/>
                     </a:tc>
                   </a:tr>
-                  <a:tr h="370840">
+                  <a:tr h="2594958">
                     <a:tc>
                       <a:txBody>
                         <a:bodyPr/>
@@ -5501,7 +5451,7 @@
                                 <m:jc m:val="centerGroup"/>
                               </m:oMathParaPr>
                               <m:oMath xmlns:m="http://schemas.openxmlformats.org/officeDocument/2006/math">
-                                <a:fld id="{1A72DB20-7854-455F-A0BE-234EAE515D25}" type="mathplaceholder">
+                                <a:fld id="{4AF3C382-C56D-44CA-A91E-B6EA30494AC4}" type="mathplaceholder">
                                   <a:rPr lang="en-US" sz="4000" i="1" smtClean="0">
                                     <a:latin typeface="Cambria Math"/>
                                   </a:rPr>
@@ -5526,7 +5476,7 @@
                       <a:tcPr/>
                     </a:tc>
                   </a:tr>
-                  <a:tr h="370840">
+                  <a:tr h="731254">
                     <a:tc>
                       <a:txBody>
                         <a:bodyPr/>
@@ -5573,14 +5523,14 @@
               <p:nvPr>
                 <p:extLst>
                   <p:ext uri="{D42A27DB-BD31-4B8C-83A1-F6EECF244321}">
-                    <p14:modId xmlns:p14="http://schemas.microsoft.com/office/powerpoint/2010/main" val="3074610803"/>
+                    <p14:modId xmlns:p14="http://schemas.microsoft.com/office/powerpoint/2010/main" val="3892515991"/>
                   </p:ext>
                 </p:extLst>
               </p:nvPr>
             </p:nvGraphicFramePr>
             <p:xfrm>
-              <a:off x="22122170" y="11377241"/>
-              <a:ext cx="7692664" cy="5994337"/>
+              <a:off x="30320374" y="8132214"/>
+              <a:ext cx="7692664" cy="6252684"/>
             </p:xfrm>
             <a:graphic>
               <a:graphicData uri="http://schemas.openxmlformats.org/drawingml/2006/table">
@@ -5593,7 +5543,7 @@
                     <a:gridCol w="3043805"/>
                     <a:gridCol w="1605054"/>
                   </a:tblGrid>
-                  <a:tr h="701040">
+                  <a:tr h="731254">
                     <a:tc>
                       <a:txBody>
                         <a:bodyPr/>
@@ -5677,7 +5627,7 @@
                       <a:tcPr/>
                     </a:tc>
                   </a:tr>
-                  <a:tr h="1358011">
+                  <a:tr h="1416539">
                     <a:tc>
                       <a:txBody>
                         <a:bodyPr/>
@@ -5702,9 +5652,9 @@
                       </a:txBody>
                       <a:tcPr>
                         <a:blipFill rotWithShape="1">
-                          <a:blip r:embed="rId8"/>
+                          <a:blip r:embed="rId7"/>
                           <a:stretch>
-                            <a:fillRect l="-100000" t="-60538" r="-52600" b="-289686"/>
+                            <a:fillRect l="-100000" t="-60345" r="-52600" b="-290517"/>
                           </a:stretch>
                         </a:blipFill>
                       </a:tcPr>
@@ -5719,15 +5669,15 @@
                       </a:txBody>
                       <a:tcPr>
                         <a:blipFill rotWithShape="1">
-                          <a:blip r:embed="rId8"/>
+                          <a:blip r:embed="rId7"/>
                           <a:stretch>
-                            <a:fillRect l="-380228" t="-60538" b="-289686"/>
+                            <a:fillRect l="-380228" t="-60345" b="-290517"/>
                           </a:stretch>
                         </a:blipFill>
                       </a:tcPr>
                     </a:tc>
                   </a:tr>
-                  <a:tr h="746506">
+                  <a:tr h="778679">
                     <a:tc>
                       <a:txBody>
                         <a:bodyPr/>
@@ -5752,9 +5702,9 @@
                       </a:txBody>
                       <a:tcPr>
                         <a:blipFill rotWithShape="1">
-                          <a:blip r:embed="rId8"/>
+                          <a:blip r:embed="rId7"/>
                           <a:stretch>
-                            <a:fillRect l="-100000" t="-291057" r="-52600" b="-425203"/>
+                            <a:fillRect l="-100000" t="-290625" r="-52600" b="-426563"/>
                           </a:stretch>
                         </a:blipFill>
                       </a:tcPr>
@@ -5769,15 +5719,15 @@
                       </a:txBody>
                       <a:tcPr>
                         <a:blipFill rotWithShape="1">
-                          <a:blip r:embed="rId8"/>
+                          <a:blip r:embed="rId7"/>
                           <a:stretch>
-                            <a:fillRect l="-380228" t="-291057" b="-425203"/>
+                            <a:fillRect l="-380228" t="-290625" b="-426563"/>
                           </a:stretch>
                         </a:blipFill>
                       </a:tcPr>
                     </a:tc>
                   </a:tr>
-                  <a:tr h="2487740">
+                  <a:tr h="2594958">
                     <a:tc>
                       <a:txBody>
                         <a:bodyPr/>
@@ -5806,9 +5756,9 @@
                       </a:txBody>
                       <a:tcPr>
                         <a:blipFill rotWithShape="1">
-                          <a:blip r:embed="rId8"/>
+                          <a:blip r:embed="rId7"/>
                           <a:stretch>
-                            <a:fillRect l="-100000" t="-117892" r="-52600" b="-28186"/>
+                            <a:fillRect l="-100000" t="-117371" r="-52600" b="-28169"/>
                           </a:stretch>
                         </a:blipFill>
                       </a:tcPr>
@@ -5824,7 +5774,7 @@
                       <a:tcPr/>
                     </a:tc>
                   </a:tr>
-                  <a:tr h="701040">
+                  <a:tr h="731254">
                     <a:tc>
                       <a:txBody>
                         <a:bodyPr/>
@@ -5862,6 +5812,198 @@
           </p:graphicFrame>
         </mc:Fallback>
       </mc:AlternateContent>
+      <p:sp>
+        <p:nvSpPr>
+          <p:cNvPr id="42" name="CaixaDeTexto 41"/>
+          <p:cNvSpPr txBox="1"/>
+          <p:nvPr/>
+        </p:nvSpPr>
+        <p:spPr>
+          <a:xfrm>
+            <a:off x="20556342" y="17473084"/>
+            <a:ext cx="5144265" cy="646331"/>
+          </a:xfrm>
+          <a:prstGeom prst="rect">
+            <a:avLst/>
+          </a:prstGeom>
+          <a:noFill/>
+        </p:spPr>
+        <p:txBody>
+          <a:bodyPr wrap="square" rtlCol="0">
+            <a:spAutoFit/>
+          </a:bodyPr>
+          <a:lstStyle/>
+          <a:p>
+            <a:r>
+              <a:rPr lang="en-US" sz="3600" dirty="0" smtClean="0">
+                <a:latin typeface="+mj-lt"/>
+              </a:rPr>
+              <a:t>GPU K-Means speed-up</a:t>
+            </a:r>
+            <a:endParaRPr lang="en-US" sz="3600" dirty="0">
+              <a:latin typeface="+mj-lt"/>
+            </a:endParaRPr>
+          </a:p>
+        </p:txBody>
+      </p:sp>
+      <p:sp>
+        <p:nvSpPr>
+          <p:cNvPr id="3" name="CaixaDeTexto 2"/>
+          <p:cNvSpPr txBox="1"/>
+          <p:nvPr/>
+        </p:nvSpPr>
+        <p:spPr>
+          <a:xfrm>
+            <a:off x="22353296" y="10612225"/>
+            <a:ext cx="7230631" cy="646331"/>
+          </a:xfrm>
+          <a:prstGeom prst="rect">
+            <a:avLst/>
+          </a:prstGeom>
+          <a:noFill/>
+        </p:spPr>
+        <p:txBody>
+          <a:bodyPr wrap="square" rtlCol="0">
+            <a:spAutoFit/>
+          </a:bodyPr>
+          <a:lstStyle/>
+          <a:p>
+            <a:r>
+              <a:rPr lang="en-US" sz="3600" dirty="0" smtClean="0">
+                <a:latin typeface="+mj-lt"/>
+              </a:rPr>
+              <a:t>Evolution of </a:t>
+            </a:r>
+            <a:r>
+              <a:rPr lang="en-US" sz="3600" dirty="0" err="1" smtClean="0">
+                <a:latin typeface="+mj-lt"/>
+              </a:rPr>
+              <a:t>K</a:t>
+            </a:r>
+            <a:r>
+              <a:rPr lang="en-US" sz="3600" baseline="-25000" dirty="0" err="1" smtClean="0">
+                <a:latin typeface="+mj-lt"/>
+              </a:rPr>
+              <a:t>min</a:t>
+            </a:r>
+            <a:r>
+              <a:rPr lang="en-US" sz="3600" dirty="0" smtClean="0">
+                <a:latin typeface="+mj-lt"/>
+              </a:rPr>
+              <a:t> with different rules</a:t>
+            </a:r>
+            <a:endParaRPr lang="en-US" sz="3600" dirty="0">
+              <a:latin typeface="+mj-lt"/>
+            </a:endParaRPr>
+          </a:p>
+        </p:txBody>
+      </p:sp>
+      <p:pic>
+        <p:nvPicPr>
+          <p:cNvPr id="14" name="Imagem 13"/>
+          <p:cNvPicPr>
+            <a:picLocks noChangeAspect="1"/>
+          </p:cNvPicPr>
+          <p:nvPr/>
+        </p:nvPicPr>
+        <p:blipFill rotWithShape="1">
+          <a:blip r:embed="rId8">
+            <a:extLst>
+              <a:ext uri="{28A0092B-C50C-407E-A947-70E740481C1C}">
+                <a14:useLocalDpi xmlns:a14="http://schemas.microsoft.com/office/drawing/2010/main" val="0"/>
+              </a:ext>
+            </a:extLst>
+          </a:blip>
+          <a:srcRect r="68291"/>
+          <a:stretch/>
+        </p:blipFill>
+        <p:spPr>
+          <a:xfrm>
+            <a:off x="9505106" y="17250410"/>
+            <a:ext cx="6157887" cy="5554962"/>
+          </a:xfrm>
+          <a:prstGeom prst="rect">
+            <a:avLst/>
+          </a:prstGeom>
+          <a:effectLst>
+            <a:outerShdw blurRad="63500" sx="102000" sy="102000" algn="ctr" rotWithShape="0">
+              <a:prstClr val="black">
+                <a:alpha val="40000"/>
+              </a:prstClr>
+            </a:outerShdw>
+          </a:effectLst>
+        </p:spPr>
+      </p:pic>
+      <p:pic>
+        <p:nvPicPr>
+          <p:cNvPr id="53" name="Imagem 52"/>
+          <p:cNvPicPr>
+            <a:picLocks noChangeAspect="1"/>
+          </p:cNvPicPr>
+          <p:nvPr/>
+        </p:nvPicPr>
+        <p:blipFill>
+          <a:blip r:embed="rId9">
+            <a:extLst>
+              <a:ext uri="{28A0092B-C50C-407E-A947-70E740481C1C}">
+                <a14:useLocalDpi xmlns:a14="http://schemas.microsoft.com/office/drawing/2010/main" val="0"/>
+              </a:ext>
+            </a:extLst>
+          </a:blip>
+          <a:stretch>
+            <a:fillRect/>
+          </a:stretch>
+        </p:blipFill>
+        <p:spPr>
+          <a:xfrm>
+            <a:off x="16750349" y="18289474"/>
+            <a:ext cx="13099677" cy="4354884"/>
+          </a:xfrm>
+          <a:prstGeom prst="rect">
+            <a:avLst/>
+          </a:prstGeom>
+          <a:solidFill>
+            <a:schemeClr val="bg1"/>
+          </a:solidFill>
+          <a:effectLst>
+            <a:outerShdw blurRad="63500" sx="102000" sy="102000" algn="ctr" rotWithShape="0">
+              <a:prstClr val="black">
+                <a:alpha val="40000"/>
+              </a:prstClr>
+            </a:outerShdw>
+          </a:effectLst>
+        </p:spPr>
+      </p:pic>
+      <p:pic>
+        <p:nvPicPr>
+          <p:cNvPr id="17" name="Imagem 16"/>
+          <p:cNvPicPr>
+            <a:picLocks noChangeAspect="1"/>
+          </p:cNvPicPr>
+          <p:nvPr/>
+        </p:nvPicPr>
+        <p:blipFill>
+          <a:blip r:embed="rId10">
+            <a:extLst>
+              <a:ext uri="{28A0092B-C50C-407E-A947-70E740481C1C}">
+                <a14:useLocalDpi xmlns:a14="http://schemas.microsoft.com/office/drawing/2010/main" val="0"/>
+              </a:ext>
+            </a:extLst>
+          </a:blip>
+          <a:stretch>
+            <a:fillRect/>
+          </a:stretch>
+        </p:blipFill>
+        <p:spPr>
+          <a:xfrm>
+            <a:off x="31107507" y="34695195"/>
+            <a:ext cx="9677400" cy="4105275"/>
+          </a:xfrm>
+          <a:prstGeom prst="rect">
+            <a:avLst/>
+          </a:prstGeom>
+        </p:spPr>
+      </p:pic>
     </p:spTree>
   </p:cSld>
   <p:clrMapOvr>

</xml_diff>

<commit_message>
changed gpu figs pattern to samples
</commit_message>
<xml_diff>
--- a/ICPRAM_poster/poster2.pptx
+++ b/ICPRAM_poster/poster2.pptx
@@ -3270,7 +3270,14 @@
                 <a:latin typeface="+mj-lt"/>
                 <a:cs typeface="Arial" pitchFamily="34" charset="0"/>
               </a:rPr>
-              <a:t> Portugal</a:t>
+              <a:t>, </a:t>
+            </a:r>
+            <a:r>
+              <a:rPr lang="en-US" sz="4800" dirty="0" smtClean="0">
+                <a:latin typeface="+mj-lt"/>
+                <a:cs typeface="Arial" pitchFamily="34" charset="0"/>
+              </a:rPr>
+              <a:t>Portugal</a:t>
             </a:r>
           </a:p>
           <a:p>
@@ -3399,8 +3406,8 @@
         </p:blipFill>
         <p:spPr>
           <a:xfrm>
-            <a:off x="1961937" y="1679625"/>
-            <a:ext cx="2214578" cy="2989096"/>
+            <a:off x="1727140" y="1517246"/>
+            <a:ext cx="3000362" cy="4049697"/>
           </a:xfrm>
           <a:prstGeom prst="rect">
             <a:avLst/>
@@ -3423,7 +3430,7 @@
         </p:blipFill>
         <p:spPr>
           <a:xfrm>
-            <a:off x="24842811" y="2315511"/>
+            <a:off x="24752671" y="1517246"/>
             <a:ext cx="4429156" cy="1717324"/>
           </a:xfrm>
           <a:prstGeom prst="rect">
@@ -3486,8 +3493,8 @@
         </p:nvSpPr>
         <p:spPr>
           <a:xfrm>
-            <a:off x="4176515" y="21100670"/>
-            <a:ext cx="3537961" cy="1987267"/>
+            <a:off x="4896595" y="21167850"/>
+            <a:ext cx="2512182" cy="1987267"/>
           </a:xfrm>
           <a:prstGeom prst="roundRect">
             <a:avLst/>
@@ -3585,17 +3592,15 @@
           </p:cNvPicPr>
           <p:nvPr/>
         </p:nvPicPr>
-        <p:blipFill>
+        <p:blipFill rotWithShape="1">
           <a:blip r:embed="rId4"/>
-          <a:srcRect r="52258"/>
-          <a:stretch>
-            <a:fillRect/>
-          </a:stretch>
+          <a:srcRect t="8397" r="52258" b="-865"/>
+          <a:stretch/>
         </p:blipFill>
         <p:spPr>
           <a:xfrm>
-            <a:off x="11809363" y="24931727"/>
-            <a:ext cx="6120680" cy="6488713"/>
+            <a:off x="8929043" y="26282897"/>
+            <a:ext cx="6132943" cy="6012000"/>
           </a:xfrm>
           <a:prstGeom prst="rect">
             <a:avLst/>
@@ -3617,17 +3622,15 @@
           </p:cNvPicPr>
           <p:nvPr/>
         </p:nvPicPr>
-        <p:blipFill>
+        <p:blipFill rotWithShape="1">
           <a:blip r:embed="rId5"/>
-          <a:srcRect r="51274"/>
-          <a:stretch>
-            <a:fillRect/>
-          </a:stretch>
+          <a:srcRect l="-5" t="10631" r="51274" b="-10631"/>
+          <a:stretch/>
         </p:blipFill>
         <p:spPr>
           <a:xfrm>
-            <a:off x="20332846" y="24875723"/>
-            <a:ext cx="7497458" cy="6536245"/>
+            <a:off x="15337755" y="26282897"/>
+            <a:ext cx="7651798" cy="6670800"/>
           </a:xfrm>
           <a:prstGeom prst="rect">
             <a:avLst/>
@@ -3649,17 +3652,15 @@
           </p:cNvPicPr>
           <p:nvPr/>
         </p:nvPicPr>
-        <p:blipFill>
+        <p:blipFill rotWithShape="1">
           <a:blip r:embed="rId4"/>
-          <a:srcRect l="52258"/>
-          <a:stretch>
-            <a:fillRect/>
-          </a:stretch>
+          <a:srcRect l="52258" t="8792" b="-8792"/>
+          <a:stretch/>
         </p:blipFill>
         <p:spPr>
           <a:xfrm>
-            <a:off x="9166157" y="34929010"/>
-            <a:ext cx="5286412" cy="5604281"/>
+            <a:off x="10136064" y="35498164"/>
+            <a:ext cx="6929883" cy="7346573"/>
           </a:xfrm>
           <a:prstGeom prst="rect">
             <a:avLst/>
@@ -3741,8 +3742,8 @@
         </p:nvSpPr>
         <p:spPr>
           <a:xfrm>
-            <a:off x="3441710" y="29314831"/>
-            <a:ext cx="4272766" cy="2071702"/>
+            <a:off x="4320531" y="29395771"/>
+            <a:ext cx="3455650" cy="2071702"/>
           </a:xfrm>
           <a:prstGeom prst="roundRect">
             <a:avLst/>
@@ -3890,8 +3891,8 @@
         </p:nvSpPr>
         <p:spPr>
           <a:xfrm>
-            <a:off x="3334461" y="38800470"/>
-            <a:ext cx="4000528" cy="2188683"/>
+            <a:off x="4104507" y="39647942"/>
+            <a:ext cx="3679571" cy="2188683"/>
           </a:xfrm>
           <a:prstGeom prst="roundRect">
             <a:avLst/>
@@ -4276,7 +4277,7 @@
         </p:nvSpPr>
         <p:spPr>
           <a:xfrm>
-            <a:off x="600322" y="7526241"/>
+            <a:off x="600322" y="7837555"/>
             <a:ext cx="9156346" cy="6332634"/>
           </a:xfrm>
           <a:prstGeom prst="rect">
@@ -4386,7 +4387,7 @@
         </p:nvSpPr>
         <p:spPr>
           <a:xfrm>
-            <a:off x="10380745" y="7488809"/>
+            <a:off x="10380745" y="7837555"/>
             <a:ext cx="11149219" cy="6332634"/>
           </a:xfrm>
           <a:prstGeom prst="rect">
@@ -4473,8 +4474,8 @@
         </p:nvSpPr>
         <p:spPr>
           <a:xfrm>
-            <a:off x="21887015" y="7561464"/>
-            <a:ext cx="7927820" cy="8724262"/>
+            <a:off x="21965340" y="7837554"/>
+            <a:ext cx="7927820" cy="9331887"/>
           </a:xfrm>
           <a:prstGeom prst="rect">
             <a:avLst/>
@@ -4500,12 +4501,16 @@
           <a:p>
             <a:pPr algn="just"/>
             <a:r>
-              <a:rPr lang="en-US" sz="6600" b="1" cap="small" dirty="0">
-                <a:latin typeface="+mj-lt"/>
-                <a:cs typeface="Arial" pitchFamily="34" charset="0"/>
-              </a:rPr>
-              <a:t>Rules</a:t>
-            </a:r>
+              <a:rPr lang="en-US" sz="6600" b="1" cap="small" dirty="0" smtClean="0">
+                <a:latin typeface="+mj-lt"/>
+                <a:cs typeface="Arial" pitchFamily="34" charset="0"/>
+              </a:rPr>
+              <a:t>Rules for ensemble</a:t>
+            </a:r>
+            <a:endParaRPr lang="en-US" sz="6600" b="1" cap="small" dirty="0">
+              <a:latin typeface="+mj-lt"/>
+              <a:cs typeface="Arial" pitchFamily="34" charset="0"/>
+            </a:endParaRPr>
           </a:p>
           <a:p>
             <a:pPr algn="just"/>
@@ -4514,14 +4519,21 @@
                 <a:latin typeface="+mj-lt"/>
                 <a:cs typeface="Arial" pitchFamily="34" charset="0"/>
               </a:rPr>
-              <a:t>Four rules for the minimum and maximum number of clusters of the </a:t>
+              <a:t>The rules for </a:t>
             </a:r>
             <a:r>
               <a:rPr lang="en-US" sz="4000" dirty="0" smtClean="0">
                 <a:latin typeface="+mj-lt"/>
                 <a:cs typeface="Arial" pitchFamily="34" charset="0"/>
               </a:rPr>
-              <a:t>ensemble were tested.</a:t>
+              <a:t>the minimum and maximum number of clusters of the </a:t>
+            </a:r>
+            <a:r>
+              <a:rPr lang="en-US" sz="4000" dirty="0" smtClean="0">
+                <a:latin typeface="+mj-lt"/>
+                <a:cs typeface="Arial" pitchFamily="34" charset="0"/>
+              </a:rPr>
+              <a:t>ensemble have a big impact on performance and memory usage. Four rules were tested.</a:t>
             </a:r>
             <a:endParaRPr lang="en-US" sz="4000" dirty="0" smtClean="0">
               <a:latin typeface="+mj-lt"/>
@@ -4545,8 +4557,8 @@
         </p:nvSpPr>
         <p:spPr>
           <a:xfrm>
-            <a:off x="20378314" y="33987753"/>
-            <a:ext cx="9659209" cy="7486797"/>
+            <a:off x="18362091" y="35139881"/>
+            <a:ext cx="11531069" cy="6984776"/>
           </a:xfrm>
           <a:prstGeom prst="rect">
             <a:avLst/>
@@ -4580,30 +4592,90 @@
             </a:r>
           </a:p>
           <a:p>
-            <a:pPr algn="just">
+            <a:pPr marL="685800" indent="-685800" algn="just">
               <a:buFont typeface="Arial" pitchFamily="34" charset="0"/>
               <a:buChar char="•"/>
             </a:pPr>
             <a:r>
-              <a:rPr lang="en-US" sz="4800" dirty="0">
-                <a:latin typeface="+mj-lt"/>
-                <a:cs typeface="Arial" pitchFamily="34" charset="0"/>
-              </a:rPr>
-              <a:t>EAC is now applicable to a wider spectrum of datasets.</a:t>
-            </a:r>
-          </a:p>
-          <a:p>
-            <a:pPr algn="just">
+              <a:rPr lang="en-US" sz="4000" dirty="0">
+                <a:latin typeface="+mj-lt"/>
+                <a:cs typeface="Arial" pitchFamily="34" charset="0"/>
+              </a:rPr>
+              <a:t>EAC is now applicable to a wider spectrum of </a:t>
+            </a:r>
+            <a:r>
+              <a:rPr lang="en-US" sz="4000" dirty="0" smtClean="0">
+                <a:latin typeface="+mj-lt"/>
+                <a:cs typeface="Arial" pitchFamily="34" charset="0"/>
+              </a:rPr>
+              <a:t>datasets – we clustered datasets of up to 10 times bigger what was before possible, but the implementation supports bigger.</a:t>
+            </a:r>
+            <a:endParaRPr lang="en-US" sz="4000" dirty="0">
+              <a:latin typeface="+mj-lt"/>
+              <a:cs typeface="Arial" pitchFamily="34" charset="0"/>
+            </a:endParaRPr>
+          </a:p>
+          <a:p>
+            <a:pPr marL="685800" indent="-685800" algn="just">
               <a:buFont typeface="Arial" pitchFamily="34" charset="0"/>
               <a:buChar char="•"/>
             </a:pPr>
             <a:r>
-              <a:rPr lang="en-US" sz="4800" dirty="0">
-                <a:latin typeface="+mj-lt"/>
-                <a:cs typeface="Arial" pitchFamily="34" charset="0"/>
-              </a:rPr>
-              <a:t>Speed-up from 6 to 200 compared to original implementation on the different phases.</a:t>
-            </a:r>
+              <a:rPr lang="en-US" sz="4000" dirty="0" smtClean="0">
+                <a:latin typeface="+mj-lt"/>
+                <a:cs typeface="Arial" pitchFamily="34" charset="0"/>
+              </a:rPr>
+              <a:t>Speed-up </a:t>
+            </a:r>
+            <a:r>
+              <a:rPr lang="en-US" sz="4000" dirty="0">
+                <a:latin typeface="+mj-lt"/>
+                <a:cs typeface="Arial" pitchFamily="34" charset="0"/>
+              </a:rPr>
+              <a:t>from 6 to 200 compared to original implementation on the different </a:t>
+            </a:r>
+            <a:r>
+              <a:rPr lang="en-US" sz="4000" dirty="0" smtClean="0">
+                <a:latin typeface="+mj-lt"/>
+                <a:cs typeface="Arial" pitchFamily="34" charset="0"/>
+              </a:rPr>
+              <a:t>phases</a:t>
+            </a:r>
+            <a:r>
+              <a:rPr lang="en-US" sz="4000" dirty="0">
+                <a:latin typeface="+mj-lt"/>
+                <a:cs typeface="Arial" pitchFamily="34" charset="0"/>
+              </a:rPr>
+              <a:t> </a:t>
+            </a:r>
+            <a:r>
+              <a:rPr lang="en-US" sz="4000" dirty="0" smtClean="0">
+                <a:latin typeface="+mj-lt"/>
+                <a:cs typeface="Arial" pitchFamily="34" charset="0"/>
+              </a:rPr>
+              <a:t>for small datasets.</a:t>
+            </a:r>
+            <a:endParaRPr lang="en-US" sz="4000" dirty="0" smtClean="0">
+              <a:latin typeface="+mj-lt"/>
+              <a:cs typeface="Arial" pitchFamily="34" charset="0"/>
+            </a:endParaRPr>
+          </a:p>
+          <a:p>
+            <a:pPr marL="685800" indent="-685800" algn="just">
+              <a:buFont typeface="Arial" pitchFamily="34" charset="0"/>
+              <a:buChar char="•"/>
+            </a:pPr>
+            <a:r>
+              <a:rPr lang="en-US" sz="4000" dirty="0" smtClean="0">
+                <a:latin typeface="+mj-lt"/>
+                <a:cs typeface="Arial" pitchFamily="34" charset="0"/>
+              </a:rPr>
+              <a:t>Better understanding of how ensemble rules affect the performance of the overall algorithm.</a:t>
+            </a:r>
+            <a:endParaRPr lang="en-US" sz="4000" dirty="0">
+              <a:latin typeface="+mj-lt"/>
+              <a:cs typeface="Arial" pitchFamily="34" charset="0"/>
+            </a:endParaRPr>
           </a:p>
         </p:txBody>
       </p:sp>
@@ -4615,8 +4687,8 @@
         </p:nvSpPr>
         <p:spPr>
           <a:xfrm>
-            <a:off x="4477469" y="15402010"/>
-            <a:ext cx="4022376" cy="1767432"/>
+            <a:off x="4608563" y="15670173"/>
+            <a:ext cx="3158280" cy="1699672"/>
           </a:xfrm>
           <a:prstGeom prst="roundRect">
             <a:avLst/>
@@ -4673,7 +4745,7 @@
         </p:nvSpPr>
         <p:spPr>
           <a:xfrm>
-            <a:off x="4205016" y="24024678"/>
+            <a:off x="4680571" y="24024678"/>
             <a:ext cx="2851819" cy="2017461"/>
           </a:xfrm>
           <a:prstGeom prst="roundRect">
@@ -4745,8 +4817,8 @@
         </p:nvSpPr>
         <p:spPr>
           <a:xfrm>
-            <a:off x="3788740" y="34203777"/>
-            <a:ext cx="3929090" cy="1899349"/>
+            <a:off x="4637119" y="33915745"/>
+            <a:ext cx="2779756" cy="1899349"/>
           </a:xfrm>
           <a:prstGeom prst="roundRect">
             <a:avLst/>
@@ -4862,7 +4934,7 @@
         </p:blipFill>
         <p:spPr>
           <a:xfrm>
-            <a:off x="22517634" y="11358166"/>
+            <a:off x="22584883" y="12719914"/>
             <a:ext cx="6688734" cy="4273951"/>
           </a:xfrm>
           <a:prstGeom prst="rect">
@@ -4888,8 +4960,8 @@
         </p:nvSpPr>
         <p:spPr>
           <a:xfrm>
-            <a:off x="11167062" y="15270063"/>
-            <a:ext cx="13432113" cy="1015663"/>
+            <a:off x="9728659" y="15330130"/>
+            <a:ext cx="9464946" cy="1015663"/>
           </a:xfrm>
           <a:prstGeom prst="rect">
             <a:avLst/>
@@ -4902,6 +4974,7 @@
           </a:bodyPr>
           <a:lstStyle/>
           <a:p>
+            <a:pPr algn="ctr"/>
             <a:r>
               <a:rPr lang="en-US" sz="6000" b="1" cap="all" dirty="0">
                 <a:latin typeface="+mj-lt"/>
@@ -4931,8 +5004,8 @@
         </p:nvSpPr>
         <p:spPr>
           <a:xfrm>
-            <a:off x="10474030" y="23834625"/>
-            <a:ext cx="14818176" cy="1015663"/>
+            <a:off x="9344873" y="23827074"/>
+            <a:ext cx="10232518" cy="1015663"/>
           </a:xfrm>
           <a:prstGeom prst="rect">
             <a:avLst/>
@@ -4964,8 +5037,8 @@
         </p:nvSpPr>
         <p:spPr>
           <a:xfrm>
-            <a:off x="5533418" y="32115545"/>
-            <a:ext cx="14844897" cy="1015663"/>
+            <a:off x="9192021" y="32972090"/>
+            <a:ext cx="10538222" cy="1015663"/>
           </a:xfrm>
           <a:prstGeom prst="rect">
             <a:avLst/>
@@ -4997,8 +5070,8 @@
         </p:nvCxnSpPr>
         <p:spPr>
           <a:xfrm>
-            <a:off x="4834659" y="23618601"/>
-            <a:ext cx="23548391" cy="0"/>
+            <a:off x="4834659" y="23619392"/>
+            <a:ext cx="17518637" cy="0"/>
           </a:xfrm>
           <a:prstGeom prst="line">
             <a:avLst/>
@@ -5034,7 +5107,7 @@
         </p:nvCxnSpPr>
         <p:spPr>
           <a:xfrm>
-            <a:off x="5334725" y="31899521"/>
+            <a:off x="5334725" y="32763617"/>
             <a:ext cx="16843790" cy="0"/>
           </a:xfrm>
           <a:prstGeom prst="line">
@@ -5074,13 +5147,13 @@
               <p:nvPr>
                 <p:extLst>
                   <p:ext uri="{D42A27DB-BD31-4B8C-83A1-F6EECF244321}">
-                    <p14:modId xmlns:p14="http://schemas.microsoft.com/office/powerpoint/2010/main" val="3892515991"/>
+                    <p14:modId xmlns:p14="http://schemas.microsoft.com/office/powerpoint/2010/main" val="2213965746"/>
                   </p:ext>
                 </p:extLst>
               </p:nvPr>
             </p:nvGraphicFramePr>
             <p:xfrm>
-              <a:off x="30320374" y="8132214"/>
+              <a:off x="31035499" y="7917505"/>
               <a:ext cx="7692664" cy="6252684"/>
             </p:xfrm>
             <a:graphic>
@@ -5451,7 +5524,7 @@
                                 <m:jc m:val="centerGroup"/>
                               </m:oMathParaPr>
                               <m:oMath xmlns:m="http://schemas.openxmlformats.org/officeDocument/2006/math">
-                                <a:fld id="{4AF3C382-C56D-44CA-A91E-B6EA30494AC4}" type="mathplaceholder">
+                                <a:fld id="{CB516788-0DD6-44A7-84E7-73FBA48E07C0}" type="mathplaceholder">
                                   <a:rPr lang="en-US" sz="4000" i="1" smtClean="0">
                                     <a:latin typeface="Cambria Math"/>
                                   </a:rPr>
@@ -5523,13 +5596,13 @@
               <p:nvPr>
                 <p:extLst>
                   <p:ext uri="{D42A27DB-BD31-4B8C-83A1-F6EECF244321}">
-                    <p14:modId xmlns:p14="http://schemas.microsoft.com/office/powerpoint/2010/main" val="3892515991"/>
+                    <p14:modId xmlns:p14="http://schemas.microsoft.com/office/powerpoint/2010/main" val="2213965746"/>
                   </p:ext>
                 </p:extLst>
               </p:nvPr>
             </p:nvGraphicFramePr>
             <p:xfrm>
-              <a:off x="30320374" y="8132214"/>
+              <a:off x="31035499" y="7917505"/>
               <a:ext cx="7692664" cy="6252684"/>
             </p:xfrm>
             <a:graphic>
@@ -5654,7 +5727,7 @@
                         <a:blipFill rotWithShape="1">
                           <a:blip r:embed="rId7"/>
                           <a:stretch>
-                            <a:fillRect l="-100000" t="-60345" r="-52600" b="-290517"/>
+                            <a:fillRect l="-99800" t="-60345" r="-52800" b="-290517"/>
                           </a:stretch>
                         </a:blipFill>
                       </a:tcPr>
@@ -5671,7 +5744,7 @@
                         <a:blipFill rotWithShape="1">
                           <a:blip r:embed="rId7"/>
                           <a:stretch>
-                            <a:fillRect l="-380228" t="-60345" b="-290517"/>
+                            <a:fillRect l="-379848" t="-60345" r="-380" b="-290517"/>
                           </a:stretch>
                         </a:blipFill>
                       </a:tcPr>
@@ -5704,7 +5777,7 @@
                         <a:blipFill rotWithShape="1">
                           <a:blip r:embed="rId7"/>
                           <a:stretch>
-                            <a:fillRect l="-100000" t="-290625" r="-52600" b="-426563"/>
+                            <a:fillRect l="-99800" t="-290625" r="-52800" b="-426563"/>
                           </a:stretch>
                         </a:blipFill>
                       </a:tcPr>
@@ -5721,7 +5794,7 @@
                         <a:blipFill rotWithShape="1">
                           <a:blip r:embed="rId7"/>
                           <a:stretch>
-                            <a:fillRect l="-380228" t="-290625" b="-426563"/>
+                            <a:fillRect l="-379848" t="-290625" r="-380" b="-426563"/>
                           </a:stretch>
                         </a:blipFill>
                       </a:tcPr>
@@ -5758,7 +5831,7 @@
                         <a:blipFill rotWithShape="1">
                           <a:blip r:embed="rId7"/>
                           <a:stretch>
-                            <a:fillRect l="-100000" t="-117371" r="-52600" b="-28169"/>
+                            <a:fillRect l="-99800" t="-117371" r="-52800" b="-28169"/>
                           </a:stretch>
                         </a:blipFill>
                       </a:tcPr>
@@ -5814,13 +5887,61 @@
       </mc:AlternateContent>
       <p:sp>
         <p:nvSpPr>
+          <p:cNvPr id="57" name="Rectângulo 56"/>
+          <p:cNvSpPr/>
+          <p:nvPr/>
+        </p:nvSpPr>
+        <p:spPr>
+          <a:xfrm>
+            <a:off x="23349786" y="23619392"/>
+            <a:ext cx="6592973" cy="10944425"/>
+          </a:xfrm>
+          <a:prstGeom prst="rect">
+            <a:avLst/>
+          </a:prstGeom>
+        </p:spPr>
+        <p:style>
+          <a:lnRef idx="2">
+            <a:schemeClr val="accent1"/>
+          </a:lnRef>
+          <a:fillRef idx="1">
+            <a:schemeClr val="lt1"/>
+          </a:fillRef>
+          <a:effectRef idx="0">
+            <a:schemeClr val="accent1"/>
+          </a:effectRef>
+          <a:fontRef idx="minor">
+            <a:schemeClr val="dk1"/>
+          </a:fontRef>
+        </p:style>
+        <p:txBody>
+          <a:bodyPr lIns="180000" rIns="180000" rtlCol="0" anchor="t" anchorCtr="0"/>
+          <a:lstStyle/>
+          <a:p>
+            <a:pPr algn="ctr"/>
+            <a:r>
+              <a:rPr lang="en-US" sz="4000" b="1" dirty="0" smtClean="0">
+                <a:latin typeface="+mj-lt"/>
+                <a:cs typeface="Arial" pitchFamily="34" charset="0"/>
+              </a:rPr>
+              <a:t>Total time</a:t>
+            </a:r>
+            <a:endParaRPr lang="en-US" sz="4000" b="1" dirty="0">
+              <a:latin typeface="+mj-lt"/>
+              <a:cs typeface="Arial" pitchFamily="34" charset="0"/>
+            </a:endParaRPr>
+          </a:p>
+        </p:txBody>
+      </p:sp>
+      <p:sp>
+        <p:nvSpPr>
           <p:cNvPr id="42" name="CaixaDeTexto 41"/>
           <p:cNvSpPr txBox="1"/>
           <p:nvPr/>
         </p:nvSpPr>
         <p:spPr>
           <a:xfrm>
-            <a:off x="20556342" y="17473084"/>
+            <a:off x="19955166" y="17571670"/>
             <a:ext cx="5144265" cy="646331"/>
           </a:xfrm>
           <a:prstGeom prst="rect">
@@ -5835,12 +5956,12 @@
           <a:lstStyle/>
           <a:p>
             <a:r>
-              <a:rPr lang="en-US" sz="3600" dirty="0" smtClean="0">
+              <a:rPr lang="en-US" sz="3600" b="1" dirty="0" smtClean="0">
                 <a:latin typeface="+mj-lt"/>
               </a:rPr>
               <a:t>GPU K-Means speed-up</a:t>
             </a:r>
-            <a:endParaRPr lang="en-US" sz="3600" dirty="0">
+            <a:endParaRPr lang="en-US" sz="3600" b="1" dirty="0">
               <a:latin typeface="+mj-lt"/>
             </a:endParaRPr>
           </a:p>
@@ -5854,7 +5975,7 @@
         </p:nvSpPr>
         <p:spPr>
           <a:xfrm>
-            <a:off x="22353296" y="10612225"/>
+            <a:off x="22313935" y="11973973"/>
             <a:ext cx="7230631" cy="646331"/>
           </a:xfrm>
           <a:prstGeom prst="rect">
@@ -5869,30 +5990,30 @@
           <a:lstStyle/>
           <a:p>
             <a:r>
-              <a:rPr lang="en-US" sz="3600" dirty="0" smtClean="0">
+              <a:rPr lang="en-US" sz="3600" b="1" dirty="0" smtClean="0">
                 <a:latin typeface="+mj-lt"/>
               </a:rPr>
               <a:t>Evolution of </a:t>
             </a:r>
             <a:r>
-              <a:rPr lang="en-US" sz="3600" dirty="0" err="1" smtClean="0">
+              <a:rPr lang="en-US" sz="3600" b="1" dirty="0" err="1" smtClean="0">
                 <a:latin typeface="+mj-lt"/>
               </a:rPr>
               <a:t>K</a:t>
             </a:r>
             <a:r>
-              <a:rPr lang="en-US" sz="3600" baseline="-25000" dirty="0" err="1" smtClean="0">
+              <a:rPr lang="en-US" sz="3600" b="1" baseline="-25000" dirty="0" err="1" smtClean="0">
                 <a:latin typeface="+mj-lt"/>
               </a:rPr>
               <a:t>min</a:t>
             </a:r>
             <a:r>
-              <a:rPr lang="en-US" sz="3600" dirty="0" smtClean="0">
+              <a:rPr lang="en-US" sz="3600" b="1" dirty="0" smtClean="0">
                 <a:latin typeface="+mj-lt"/>
               </a:rPr>
               <a:t> with different rules</a:t>
             </a:r>
-            <a:endParaRPr lang="en-US" sz="3600" dirty="0">
+            <a:endParaRPr lang="en-US" sz="3600" b="1" dirty="0">
               <a:latin typeface="+mj-lt"/>
             </a:endParaRPr>
           </a:p>
@@ -5914,13 +6035,13 @@
               </a:ext>
             </a:extLst>
           </a:blip>
-          <a:srcRect r="68291"/>
+          <a:srcRect t="4554" r="68291"/>
           <a:stretch/>
         </p:blipFill>
         <p:spPr>
           <a:xfrm>
-            <a:off x="9505106" y="17250410"/>
-            <a:ext cx="6157887" cy="5554962"/>
+            <a:off x="8881244" y="17785953"/>
+            <a:ext cx="6157887" cy="5301984"/>
           </a:xfrm>
           <a:prstGeom prst="rect">
             <a:avLst/>
@@ -5936,14 +6057,180 @@
       </p:pic>
       <p:pic>
         <p:nvPicPr>
-          <p:cNvPr id="53" name="Imagem 52"/>
+          <p:cNvPr id="55" name="Imagem 54"/>
+          <p:cNvPicPr>
+            <a:picLocks noChangeAspect="1"/>
+          </p:cNvPicPr>
+          <p:nvPr/>
+        </p:nvPicPr>
+        <p:blipFill rotWithShape="1">
+          <a:blip r:embed="rId9">
+            <a:extLst>
+              <a:ext uri="{28A0092B-C50C-407E-A947-70E740481C1C}">
+                <a14:useLocalDpi xmlns:a14="http://schemas.microsoft.com/office/drawing/2010/main" val="0"/>
+              </a:ext>
+            </a:extLst>
+          </a:blip>
+          <a:srcRect l="50000" r="-402"/>
+          <a:stretch/>
+        </p:blipFill>
+        <p:spPr>
+          <a:xfrm>
+            <a:off x="23766218" y="29499768"/>
+            <a:ext cx="5760109" cy="4848025"/>
+          </a:xfrm>
+          <a:prstGeom prst="rect">
+            <a:avLst/>
+          </a:prstGeom>
+          <a:effectLst/>
+        </p:spPr>
+      </p:pic>
+      <p:pic>
+        <p:nvPicPr>
+          <p:cNvPr id="56" name="Imagem 55"/>
+          <p:cNvPicPr>
+            <a:picLocks noChangeAspect="1"/>
+          </p:cNvPicPr>
+          <p:nvPr/>
+        </p:nvPicPr>
+        <p:blipFill rotWithShape="1">
+          <a:blip r:embed="rId9">
+            <a:extLst>
+              <a:ext uri="{28A0092B-C50C-407E-A947-70E740481C1C}">
+                <a14:useLocalDpi xmlns:a14="http://schemas.microsoft.com/office/drawing/2010/main" val="0"/>
+              </a:ext>
+            </a:extLst>
+          </a:blip>
+          <a:srcRect l="-475" r="49866"/>
+          <a:stretch/>
+        </p:blipFill>
+        <p:spPr>
+          <a:xfrm>
+            <a:off x="23766272" y="24530899"/>
+            <a:ext cx="5760000" cy="4828133"/>
+          </a:xfrm>
+          <a:prstGeom prst="rect">
+            <a:avLst/>
+          </a:prstGeom>
+          <a:effectLst/>
+        </p:spPr>
+      </p:pic>
+      <p:sp>
+        <p:nvSpPr>
+          <p:cNvPr id="22" name="Chamada rectangular arredondada 21"/>
+          <p:cNvSpPr/>
+          <p:nvPr/>
+        </p:nvSpPr>
+        <p:spPr>
+          <a:xfrm>
+            <a:off x="5400651" y="18290009"/>
+            <a:ext cx="2686695" cy="2267302"/>
+          </a:xfrm>
+          <a:prstGeom prst="wedgeRoundRectCallout">
+            <a:avLst>
+              <a:gd name="adj1" fmla="val 69621"/>
+              <a:gd name="adj2" fmla="val -15056"/>
+              <a:gd name="adj3" fmla="val 16667"/>
+            </a:avLst>
+          </a:prstGeom>
+        </p:spPr>
+        <p:style>
+          <a:lnRef idx="2">
+            <a:schemeClr val="accent1">
+              <a:shade val="50000"/>
+            </a:schemeClr>
+          </a:lnRef>
+          <a:fillRef idx="1">
+            <a:schemeClr val="accent1"/>
+          </a:fillRef>
+          <a:effectRef idx="0">
+            <a:schemeClr val="accent1"/>
+          </a:effectRef>
+          <a:fontRef idx="minor">
+            <a:schemeClr val="lt1"/>
+          </a:fontRef>
+        </p:style>
+        <p:txBody>
+          <a:bodyPr rtlCol="0" anchor="ctr"/>
+          <a:lstStyle/>
+          <a:p>
+            <a:pPr algn="ctr"/>
+            <a:r>
+              <a:rPr lang="en-US" sz="2800" dirty="0" smtClean="0"/>
+              <a:t>We used a 2-dimensional mixture of 6 Gaussians for most tests.</a:t>
+            </a:r>
+            <a:endParaRPr lang="en-US" sz="2800" dirty="0"/>
+          </a:p>
+        </p:txBody>
+      </p:sp>
+      <p:sp>
+        <p:nvSpPr>
+          <p:cNvPr id="60" name="Chamada rectangular arredondada 59"/>
+          <p:cNvSpPr/>
+          <p:nvPr/>
+        </p:nvSpPr>
+        <p:spPr>
+          <a:xfrm>
+            <a:off x="31323531" y="17223806"/>
+            <a:ext cx="1683106" cy="1375325"/>
+          </a:xfrm>
+          <a:prstGeom prst="wedgeRoundRectCallout">
+            <a:avLst>
+              <a:gd name="adj1" fmla="val 53648"/>
+              <a:gd name="adj2" fmla="val 78885"/>
+              <a:gd name="adj3" fmla="val 16667"/>
+            </a:avLst>
+          </a:prstGeom>
+        </p:spPr>
+        <p:style>
+          <a:lnRef idx="2">
+            <a:schemeClr val="accent1">
+              <a:shade val="50000"/>
+            </a:schemeClr>
+          </a:lnRef>
+          <a:fillRef idx="1">
+            <a:schemeClr val="accent1"/>
+          </a:fillRef>
+          <a:effectRef idx="0">
+            <a:schemeClr val="accent1"/>
+          </a:effectRef>
+          <a:fontRef idx="minor">
+            <a:schemeClr val="lt1"/>
+          </a:fontRef>
+        </p:style>
+        <p:txBody>
+          <a:bodyPr rtlCol="0" anchor="ctr"/>
+          <a:lstStyle/>
+          <a:p>
+            <a:pPr algn="ctr"/>
+            <a:r>
+              <a:rPr lang="en-US" sz="2800" dirty="0" smtClean="0"/>
+              <a:t>Random datasets.</a:t>
+            </a:r>
+            <a:endParaRPr lang="en-US" sz="2800" dirty="0"/>
+          </a:p>
+        </p:txBody>
+      </p:sp>
+      <p:pic>
+        <p:nvPicPr>
+          <p:cNvPr id="23" name="Imagem 22"/>
           <p:cNvPicPr>
             <a:picLocks noChangeAspect="1"/>
           </p:cNvPicPr>
           <p:nvPr/>
         </p:nvPicPr>
         <p:blipFill>
-          <a:blip r:embed="rId9">
+          <a:blip r:embed="rId10" cstate="print">
+            <a:clrChange>
+              <a:clrFrom>
+                <a:srgbClr val="FFFFFF"/>
+              </a:clrFrom>
+              <a:clrTo>
+                <a:srgbClr val="FFFFFF">
+                  <a:alpha val="0"/>
+                </a:srgbClr>
+              </a:clrTo>
+            </a:clrChange>
             <a:extLst>
               <a:ext uri="{28A0092B-C50C-407E-A947-70E740481C1C}">
                 <a14:useLocalDpi xmlns:a14="http://schemas.microsoft.com/office/drawing/2010/main" val="0"/>
@@ -5956,34 +6243,272 @@
         </p:blipFill>
         <p:spPr>
           <a:xfrm>
-            <a:off x="16750349" y="18289474"/>
-            <a:ext cx="13099677" cy="4354884"/>
+            <a:off x="24753249" y="3647927"/>
+            <a:ext cx="4428000" cy="2952000"/>
           </a:xfrm>
           <a:prstGeom prst="rect">
             <a:avLst/>
           </a:prstGeom>
-          <a:solidFill>
-            <a:schemeClr val="bg1"/>
-          </a:solidFill>
-          <a:effectLst>
-            <a:outerShdw blurRad="63500" sx="102000" sy="102000" algn="ctr" rotWithShape="0">
-              <a:prstClr val="black">
-                <a:alpha val="40000"/>
-              </a:prstClr>
-            </a:outerShdw>
-          </a:effectLst>
         </p:spPr>
       </p:pic>
+      <p:sp>
+        <p:nvSpPr>
+          <p:cNvPr id="64" name="Chamada rectangular arredondada 63"/>
+          <p:cNvSpPr/>
+          <p:nvPr/>
+        </p:nvSpPr>
+        <p:spPr>
+          <a:xfrm>
+            <a:off x="5334725" y="26851855"/>
+            <a:ext cx="2981059" cy="2022934"/>
+          </a:xfrm>
+          <a:prstGeom prst="wedgeRoundRectCallout">
+            <a:avLst>
+              <a:gd name="adj1" fmla="val 66256"/>
+              <a:gd name="adj2" fmla="val -22896"/>
+              <a:gd name="adj3" fmla="val 16667"/>
+            </a:avLst>
+          </a:prstGeom>
+        </p:spPr>
+        <p:style>
+          <a:lnRef idx="2">
+            <a:schemeClr val="accent1">
+              <a:shade val="50000"/>
+            </a:schemeClr>
+          </a:lnRef>
+          <a:fillRef idx="1">
+            <a:schemeClr val="accent1"/>
+          </a:fillRef>
+          <a:effectRef idx="0">
+            <a:schemeClr val="accent1"/>
+          </a:effectRef>
+          <a:fontRef idx="minor">
+            <a:schemeClr val="lt1"/>
+          </a:fontRef>
+        </p:style>
+        <p:txBody>
+          <a:bodyPr rtlCol="0" anchor="ctr"/>
+          <a:lstStyle/>
+          <a:p>
+            <a:pPr algn="ctr"/>
+            <a:r>
+              <a:rPr lang="en-US" sz="2800" dirty="0" smtClean="0"/>
+              <a:t>Condensed matrices only have the upper triangular filled.</a:t>
+            </a:r>
+            <a:endParaRPr lang="en-US" sz="2800" dirty="0"/>
+          </a:p>
+        </p:txBody>
+      </p:sp>
+      <p:sp>
+        <p:nvSpPr>
+          <p:cNvPr id="65" name="Chamada rectangular arredondada 64"/>
+          <p:cNvSpPr/>
+          <p:nvPr/>
+        </p:nvSpPr>
+        <p:spPr>
+          <a:xfrm>
+            <a:off x="5666284" y="36500422"/>
+            <a:ext cx="2981059" cy="2300048"/>
+          </a:xfrm>
+          <a:prstGeom prst="wedgeRoundRectCallout">
+            <a:avLst>
+              <a:gd name="adj1" fmla="val 61463"/>
+              <a:gd name="adj2" fmla="val -68098"/>
+              <a:gd name="adj3" fmla="val 16667"/>
+            </a:avLst>
+          </a:prstGeom>
+        </p:spPr>
+        <p:style>
+          <a:lnRef idx="2">
+            <a:schemeClr val="accent1">
+              <a:shade val="50000"/>
+            </a:schemeClr>
+          </a:lnRef>
+          <a:fillRef idx="1">
+            <a:schemeClr val="accent1"/>
+          </a:fillRef>
+          <a:effectRef idx="0">
+            <a:schemeClr val="accent1"/>
+          </a:effectRef>
+          <a:fontRef idx="minor">
+            <a:schemeClr val="lt1"/>
+          </a:fontRef>
+        </p:style>
+        <p:txBody>
+          <a:bodyPr rtlCol="0" anchor="ctr"/>
+          <a:lstStyle/>
+          <a:p>
+            <a:pPr algn="ctr"/>
+            <a:r>
+              <a:rPr lang="en-US" sz="2800" dirty="0" smtClean="0"/>
+              <a:t>SLINK is a fast implementation of SL that works over non-sparse matrices.</a:t>
+            </a:r>
+            <a:endParaRPr lang="en-US" sz="2800" dirty="0"/>
+          </a:p>
+        </p:txBody>
+      </p:sp>
+      <p:sp>
+        <p:nvSpPr>
+          <p:cNvPr id="67" name="CaixaDeTexto 66"/>
+          <p:cNvSpPr txBox="1"/>
+          <p:nvPr/>
+        </p:nvSpPr>
+        <p:spPr>
+          <a:xfrm>
+            <a:off x="8817081" y="17139622"/>
+            <a:ext cx="6016618" cy="646331"/>
+          </a:xfrm>
+          <a:prstGeom prst="rect">
+            <a:avLst/>
+          </a:prstGeom>
+          <a:noFill/>
+        </p:spPr>
+        <p:txBody>
+          <a:bodyPr wrap="square" rtlCol="0">
+            <a:spAutoFit/>
+          </a:bodyPr>
+          <a:lstStyle/>
+          <a:p>
+            <a:pPr algn="ctr"/>
+            <a:r>
+              <a:rPr lang="en-US" sz="3600" b="1" dirty="0" smtClean="0">
+                <a:latin typeface="+mj-lt"/>
+              </a:rPr>
+              <a:t>Production of the ensemble</a:t>
+            </a:r>
+            <a:endParaRPr lang="en-US" sz="3600" b="1" dirty="0">
+              <a:latin typeface="+mj-lt"/>
+            </a:endParaRPr>
+          </a:p>
+        </p:txBody>
+      </p:sp>
+      <p:sp>
+        <p:nvSpPr>
+          <p:cNvPr id="68" name="CaixaDeTexto 67"/>
+          <p:cNvSpPr txBox="1"/>
+          <p:nvPr/>
+        </p:nvSpPr>
+        <p:spPr>
+          <a:xfrm>
+            <a:off x="8987205" y="25082568"/>
+            <a:ext cx="6016618" cy="1200329"/>
+          </a:xfrm>
+          <a:prstGeom prst="rect">
+            <a:avLst/>
+          </a:prstGeom>
+          <a:noFill/>
+        </p:spPr>
+        <p:txBody>
+          <a:bodyPr wrap="square" rtlCol="0">
+            <a:spAutoFit/>
+          </a:bodyPr>
+          <a:lstStyle/>
+          <a:p>
+            <a:pPr algn="ctr"/>
+            <a:r>
+              <a:rPr lang="en-US" sz="3600" b="1" dirty="0" smtClean="0">
+                <a:latin typeface="+mj-lt"/>
+              </a:rPr>
+              <a:t>Building with different matrix formats</a:t>
+            </a:r>
+            <a:endParaRPr lang="en-US" sz="3600" b="1" dirty="0">
+              <a:latin typeface="+mj-lt"/>
+            </a:endParaRPr>
+          </a:p>
+        </p:txBody>
+      </p:sp>
+      <p:sp>
+        <p:nvSpPr>
+          <p:cNvPr id="69" name="CaixaDeTexto 68"/>
+          <p:cNvSpPr txBox="1"/>
+          <p:nvPr/>
+        </p:nvSpPr>
+        <p:spPr>
+          <a:xfrm>
+            <a:off x="16155345" y="25082568"/>
+            <a:ext cx="6016618" cy="1200329"/>
+          </a:xfrm>
+          <a:prstGeom prst="rect">
+            <a:avLst/>
+          </a:prstGeom>
+          <a:noFill/>
+        </p:spPr>
+        <p:txBody>
+          <a:bodyPr wrap="square" rtlCol="0">
+            <a:spAutoFit/>
+          </a:bodyPr>
+          <a:lstStyle/>
+          <a:p>
+            <a:pPr algn="ctr"/>
+            <a:r>
+              <a:rPr lang="en-US" sz="3600" b="1" dirty="0" smtClean="0">
+                <a:latin typeface="+mj-lt"/>
+              </a:rPr>
+              <a:t>Density of associations relative to the full </a:t>
+            </a:r>
+            <a:r>
+              <a:rPr lang="en-US" sz="3600" b="1" dirty="0" err="1" smtClean="0">
+                <a:latin typeface="+mj-lt"/>
+              </a:rPr>
+              <a:t>nxn</a:t>
+            </a:r>
+            <a:r>
+              <a:rPr lang="en-US" sz="3600" b="1" dirty="0" smtClean="0">
+                <a:latin typeface="+mj-lt"/>
+              </a:rPr>
+              <a:t> matrix</a:t>
+            </a:r>
+            <a:endParaRPr lang="en-US" sz="3600" b="1" dirty="0">
+              <a:latin typeface="+mj-lt"/>
+            </a:endParaRPr>
+          </a:p>
+        </p:txBody>
+      </p:sp>
+      <p:sp>
+        <p:nvSpPr>
+          <p:cNvPr id="72" name="CaixaDeTexto 71"/>
+          <p:cNvSpPr txBox="1"/>
+          <p:nvPr/>
+        </p:nvSpPr>
+        <p:spPr>
+          <a:xfrm>
+            <a:off x="10592696" y="34299592"/>
+            <a:ext cx="6016618" cy="1200329"/>
+          </a:xfrm>
+          <a:prstGeom prst="rect">
+            <a:avLst/>
+          </a:prstGeom>
+          <a:noFill/>
+        </p:spPr>
+        <p:txBody>
+          <a:bodyPr wrap="square" rtlCol="0">
+            <a:spAutoFit/>
+          </a:bodyPr>
+          <a:lstStyle/>
+          <a:p>
+            <a:pPr algn="ctr"/>
+            <a:r>
+              <a:rPr lang="en-US" sz="3600" b="1" dirty="0" smtClean="0">
+                <a:latin typeface="+mj-lt"/>
+              </a:rPr>
+              <a:t>Comparison of three methods for extraction</a:t>
+            </a:r>
+            <a:endParaRPr lang="en-US" sz="3600" b="1" dirty="0">
+              <a:latin typeface="+mj-lt"/>
+            </a:endParaRPr>
+          </a:p>
+        </p:txBody>
+      </p:sp>
       <p:pic>
         <p:nvPicPr>
-          <p:cNvPr id="17" name="Imagem 16"/>
+          <p:cNvPr id="24" name="Imagem 23"/>
           <p:cNvPicPr>
             <a:picLocks noChangeAspect="1"/>
           </p:cNvPicPr>
           <p:nvPr/>
         </p:nvPicPr>
         <p:blipFill>
-          <a:blip r:embed="rId10">
+          <a:blip r:embed="rId11">
             <a:extLst>
               <a:ext uri="{28A0092B-C50C-407E-A947-70E740481C1C}">
                 <a14:useLocalDpi xmlns:a14="http://schemas.microsoft.com/office/drawing/2010/main" val="0"/>
@@ -5996,12 +6521,19 @@
         </p:blipFill>
         <p:spPr>
           <a:xfrm>
-            <a:off x="31107507" y="34695195"/>
-            <a:ext cx="9677400" cy="4105275"/>
+            <a:off x="15337755" y="18282765"/>
+            <a:ext cx="14425809" cy="4805172"/>
           </a:xfrm>
           <a:prstGeom prst="rect">
             <a:avLst/>
           </a:prstGeom>
+          <a:effectLst>
+            <a:outerShdw blurRad="63500" sx="102000" sy="102000" algn="ctr" rotWithShape="0">
+              <a:prstClr val="black">
+                <a:alpha val="40000"/>
+              </a:prstClr>
+            </a:outerShdw>
+          </a:effectLst>
         </p:spPr>
       </p:pic>
     </p:spTree>

</xml_diff>